<commit_message>
big stuff commiting (semester 5 & 6) some more assignments
</commit_message>
<xml_diff>
--- a/semester 5/sensors_and_actuators/saa_1_static_sensor_characteristics.pptx
+++ b/semester 5/sensors_and_actuators/saa_1_static_sensor_characteristics.pptx
@@ -12,7 +12,7 @@
   <p:sldIdLst>
     <p:sldId id="256" r:id="rId4"/>
     <p:sldId id="270" r:id="rId5"/>
-    <p:sldId id="260" r:id="rId6"/>
+    <p:sldId id="300" r:id="rId6"/>
     <p:sldId id="258" r:id="rId7"/>
     <p:sldId id="261" r:id="rId8"/>
     <p:sldId id="265" r:id="rId9"/>
@@ -138,7 +138,7 @@
         <p14:section name="Overview" id="{182DAED3-CCFD-4C31-AA6F-577B81206013}">
           <p14:sldIdLst>
             <p14:sldId id="270"/>
-            <p14:sldId id="260"/>
+            <p14:sldId id="300"/>
           </p14:sldIdLst>
         </p14:section>
         <p14:section name="Systematic Characteristics" id="{408ABDE6-3ED7-409F-88BA-59572D30013F}">
@@ -183,6 +183,2620 @@
     </p:ext>
   </p:extLst>
 </p:presentation>
+</file>
+
+<file path=ppt/diagrams/colors1.xml><?xml version="1.0" encoding="utf-8"?>
+<dgm:colorsDef xmlns:dgm="http://schemas.openxmlformats.org/drawingml/2006/diagram" xmlns:a="http://schemas.openxmlformats.org/drawingml/2006/main" uniqueId="urn:microsoft.com/office/officeart/2005/8/colors/accent5_1">
+  <dgm:title val=""/>
+  <dgm:desc val=""/>
+  <dgm:catLst>
+    <dgm:cat type="accent5" pri="11100"/>
+  </dgm:catLst>
+  <dgm:styleLbl name="node0">
+    <dgm:fillClrLst meth="repeat">
+      <a:schemeClr val="lt1"/>
+    </dgm:fillClrLst>
+    <dgm:linClrLst meth="repeat">
+      <a:schemeClr val="accent5">
+        <a:shade val="80000"/>
+      </a:schemeClr>
+    </dgm:linClrLst>
+    <dgm:effectClrLst/>
+    <dgm:txLinClrLst/>
+    <dgm:txFillClrLst meth="repeat">
+      <a:schemeClr val="dk1"/>
+    </dgm:txFillClrLst>
+    <dgm:txEffectClrLst/>
+  </dgm:styleLbl>
+  <dgm:styleLbl name="node1">
+    <dgm:fillClrLst meth="repeat">
+      <a:schemeClr val="lt1"/>
+    </dgm:fillClrLst>
+    <dgm:linClrLst meth="repeat">
+      <a:schemeClr val="accent5">
+        <a:shade val="80000"/>
+      </a:schemeClr>
+    </dgm:linClrLst>
+    <dgm:effectClrLst/>
+    <dgm:txLinClrLst/>
+    <dgm:txFillClrLst meth="repeat">
+      <a:schemeClr val="dk1"/>
+    </dgm:txFillClrLst>
+    <dgm:txEffectClrLst/>
+  </dgm:styleLbl>
+  <dgm:styleLbl name="alignNode1">
+    <dgm:fillClrLst meth="repeat">
+      <a:schemeClr val="lt1"/>
+    </dgm:fillClrLst>
+    <dgm:linClrLst meth="repeat">
+      <a:schemeClr val="accent5">
+        <a:shade val="80000"/>
+      </a:schemeClr>
+    </dgm:linClrLst>
+    <dgm:effectClrLst/>
+    <dgm:txLinClrLst/>
+    <dgm:txFillClrLst meth="repeat">
+      <a:schemeClr val="dk1"/>
+    </dgm:txFillClrLst>
+    <dgm:txEffectClrLst/>
+  </dgm:styleLbl>
+  <dgm:styleLbl name="lnNode1">
+    <dgm:fillClrLst meth="repeat">
+      <a:schemeClr val="lt1"/>
+    </dgm:fillClrLst>
+    <dgm:linClrLst meth="repeat">
+      <a:schemeClr val="accent5">
+        <a:shade val="80000"/>
+      </a:schemeClr>
+    </dgm:linClrLst>
+    <dgm:effectClrLst/>
+    <dgm:txLinClrLst/>
+    <dgm:txFillClrLst meth="repeat">
+      <a:schemeClr val="dk1"/>
+    </dgm:txFillClrLst>
+    <dgm:txEffectClrLst/>
+  </dgm:styleLbl>
+  <dgm:styleLbl name="vennNode1">
+    <dgm:fillClrLst meth="repeat">
+      <a:schemeClr val="lt1">
+        <a:alpha val="50000"/>
+      </a:schemeClr>
+    </dgm:fillClrLst>
+    <dgm:linClrLst meth="repeat">
+      <a:schemeClr val="accent5">
+        <a:shade val="80000"/>
+      </a:schemeClr>
+    </dgm:linClrLst>
+    <dgm:effectClrLst/>
+    <dgm:txLinClrLst/>
+    <dgm:txFillClrLst/>
+    <dgm:txEffectClrLst/>
+  </dgm:styleLbl>
+  <dgm:styleLbl name="node2">
+    <dgm:fillClrLst meth="repeat">
+      <a:schemeClr val="lt1"/>
+    </dgm:fillClrLst>
+    <dgm:linClrLst meth="repeat">
+      <a:schemeClr val="accent5">
+        <a:shade val="80000"/>
+      </a:schemeClr>
+    </dgm:linClrLst>
+    <dgm:effectClrLst/>
+    <dgm:txLinClrLst/>
+    <dgm:txFillClrLst meth="repeat">
+      <a:schemeClr val="dk1"/>
+    </dgm:txFillClrLst>
+    <dgm:txEffectClrLst/>
+  </dgm:styleLbl>
+  <dgm:styleLbl name="node3">
+    <dgm:fillClrLst meth="repeat">
+      <a:schemeClr val="lt1"/>
+    </dgm:fillClrLst>
+    <dgm:linClrLst meth="repeat">
+      <a:schemeClr val="accent5">
+        <a:shade val="80000"/>
+      </a:schemeClr>
+    </dgm:linClrLst>
+    <dgm:effectClrLst/>
+    <dgm:txLinClrLst/>
+    <dgm:txFillClrLst meth="repeat">
+      <a:schemeClr val="dk1"/>
+    </dgm:txFillClrLst>
+    <dgm:txEffectClrLst/>
+  </dgm:styleLbl>
+  <dgm:styleLbl name="node4">
+    <dgm:fillClrLst meth="repeat">
+      <a:schemeClr val="lt1"/>
+    </dgm:fillClrLst>
+    <dgm:linClrLst meth="repeat">
+      <a:schemeClr val="accent5">
+        <a:shade val="80000"/>
+      </a:schemeClr>
+    </dgm:linClrLst>
+    <dgm:effectClrLst/>
+    <dgm:txLinClrLst/>
+    <dgm:txFillClrLst meth="repeat">
+      <a:schemeClr val="dk1"/>
+    </dgm:txFillClrLst>
+    <dgm:txEffectClrLst/>
+  </dgm:styleLbl>
+  <dgm:styleLbl name="fgImgPlace1">
+    <dgm:fillClrLst meth="repeat">
+      <a:schemeClr val="accent5">
+        <a:tint val="40000"/>
+      </a:schemeClr>
+    </dgm:fillClrLst>
+    <dgm:linClrLst meth="repeat">
+      <a:schemeClr val="accent5">
+        <a:shade val="80000"/>
+      </a:schemeClr>
+    </dgm:linClrLst>
+    <dgm:effectClrLst/>
+    <dgm:txLinClrLst/>
+    <dgm:txFillClrLst meth="repeat">
+      <a:schemeClr val="lt1"/>
+    </dgm:txFillClrLst>
+    <dgm:txEffectClrLst/>
+  </dgm:styleLbl>
+  <dgm:styleLbl name="alignImgPlace1">
+    <dgm:fillClrLst meth="repeat">
+      <a:schemeClr val="accent5">
+        <a:tint val="40000"/>
+      </a:schemeClr>
+    </dgm:fillClrLst>
+    <dgm:linClrLst meth="repeat">
+      <a:schemeClr val="accent5">
+        <a:shade val="80000"/>
+      </a:schemeClr>
+    </dgm:linClrLst>
+    <dgm:effectClrLst/>
+    <dgm:txLinClrLst/>
+    <dgm:txFillClrLst meth="repeat">
+      <a:schemeClr val="lt1"/>
+    </dgm:txFillClrLst>
+    <dgm:txEffectClrLst/>
+  </dgm:styleLbl>
+  <dgm:styleLbl name="bgImgPlace1">
+    <dgm:fillClrLst meth="repeat">
+      <a:schemeClr val="accent5">
+        <a:tint val="40000"/>
+      </a:schemeClr>
+    </dgm:fillClrLst>
+    <dgm:linClrLst meth="repeat">
+      <a:schemeClr val="accent5">
+        <a:shade val="80000"/>
+      </a:schemeClr>
+    </dgm:linClrLst>
+    <dgm:effectClrLst/>
+    <dgm:txLinClrLst/>
+    <dgm:txFillClrLst meth="repeat">
+      <a:schemeClr val="lt1"/>
+    </dgm:txFillClrLst>
+    <dgm:txEffectClrLst/>
+  </dgm:styleLbl>
+  <dgm:styleLbl name="sibTrans2D1">
+    <dgm:fillClrLst meth="repeat">
+      <a:schemeClr val="accent5">
+        <a:tint val="60000"/>
+      </a:schemeClr>
+    </dgm:fillClrLst>
+    <dgm:linClrLst meth="repeat">
+      <a:schemeClr val="accent5">
+        <a:tint val="60000"/>
+      </a:schemeClr>
+    </dgm:linClrLst>
+    <dgm:effectClrLst/>
+    <dgm:txLinClrLst/>
+    <dgm:txFillClrLst meth="repeat">
+      <a:schemeClr val="dk1"/>
+    </dgm:txFillClrLst>
+    <dgm:txEffectClrLst/>
+  </dgm:styleLbl>
+  <dgm:styleLbl name="fgSibTrans2D1">
+    <dgm:fillClrLst meth="repeat">
+      <a:schemeClr val="accent5">
+        <a:tint val="60000"/>
+      </a:schemeClr>
+    </dgm:fillClrLst>
+    <dgm:linClrLst meth="repeat">
+      <a:schemeClr val="accent5">
+        <a:tint val="60000"/>
+      </a:schemeClr>
+    </dgm:linClrLst>
+    <dgm:effectClrLst/>
+    <dgm:txLinClrLst/>
+    <dgm:txFillClrLst meth="repeat">
+      <a:schemeClr val="dk1"/>
+    </dgm:txFillClrLst>
+    <dgm:txEffectClrLst/>
+  </dgm:styleLbl>
+  <dgm:styleLbl name="bgSibTrans2D1">
+    <dgm:fillClrLst meth="repeat">
+      <a:schemeClr val="accent5">
+        <a:tint val="60000"/>
+      </a:schemeClr>
+    </dgm:fillClrLst>
+    <dgm:linClrLst meth="repeat">
+      <a:schemeClr val="accent5">
+        <a:tint val="60000"/>
+      </a:schemeClr>
+    </dgm:linClrLst>
+    <dgm:effectClrLst/>
+    <dgm:txLinClrLst/>
+    <dgm:txFillClrLst meth="repeat">
+      <a:schemeClr val="dk1"/>
+    </dgm:txFillClrLst>
+    <dgm:txEffectClrLst/>
+  </dgm:styleLbl>
+  <dgm:styleLbl name="sibTrans1D1">
+    <dgm:fillClrLst meth="repeat">
+      <a:schemeClr val="accent5"/>
+    </dgm:fillClrLst>
+    <dgm:linClrLst meth="repeat">
+      <a:schemeClr val="accent5"/>
+    </dgm:linClrLst>
+    <dgm:effectClrLst/>
+    <dgm:txLinClrLst/>
+    <dgm:txFillClrLst meth="repeat">
+      <a:schemeClr val="tx1"/>
+    </dgm:txFillClrLst>
+    <dgm:txEffectClrLst/>
+  </dgm:styleLbl>
+  <dgm:styleLbl name="callout">
+    <dgm:fillClrLst meth="repeat">
+      <a:schemeClr val="accent5"/>
+    </dgm:fillClrLst>
+    <dgm:linClrLst meth="repeat">
+      <a:schemeClr val="accent5"/>
+    </dgm:linClrLst>
+    <dgm:effectClrLst/>
+    <dgm:txLinClrLst/>
+    <dgm:txFillClrLst meth="repeat">
+      <a:schemeClr val="tx1"/>
+    </dgm:txFillClrLst>
+    <dgm:txEffectClrLst/>
+  </dgm:styleLbl>
+  <dgm:styleLbl name="asst0">
+    <dgm:fillClrLst meth="repeat">
+      <a:schemeClr val="lt1"/>
+    </dgm:fillClrLst>
+    <dgm:linClrLst meth="repeat">
+      <a:schemeClr val="accent5">
+        <a:shade val="80000"/>
+      </a:schemeClr>
+    </dgm:linClrLst>
+    <dgm:effectClrLst/>
+    <dgm:txLinClrLst/>
+    <dgm:txFillClrLst meth="repeat">
+      <a:schemeClr val="dk1"/>
+    </dgm:txFillClrLst>
+    <dgm:txEffectClrLst/>
+  </dgm:styleLbl>
+  <dgm:styleLbl name="asst1">
+    <dgm:fillClrLst meth="repeat">
+      <a:schemeClr val="lt1"/>
+    </dgm:fillClrLst>
+    <dgm:linClrLst meth="repeat">
+      <a:schemeClr val="accent5">
+        <a:shade val="80000"/>
+      </a:schemeClr>
+    </dgm:linClrLst>
+    <dgm:effectClrLst/>
+    <dgm:txLinClrLst/>
+    <dgm:txFillClrLst meth="repeat">
+      <a:schemeClr val="dk1"/>
+    </dgm:txFillClrLst>
+    <dgm:txEffectClrLst/>
+  </dgm:styleLbl>
+  <dgm:styleLbl name="asst2">
+    <dgm:fillClrLst meth="repeat">
+      <a:schemeClr val="lt1"/>
+    </dgm:fillClrLst>
+    <dgm:linClrLst meth="repeat">
+      <a:schemeClr val="accent5">
+        <a:shade val="80000"/>
+      </a:schemeClr>
+    </dgm:linClrLst>
+    <dgm:effectClrLst/>
+    <dgm:txLinClrLst/>
+    <dgm:txFillClrLst meth="repeat">
+      <a:schemeClr val="dk1"/>
+    </dgm:txFillClrLst>
+    <dgm:txEffectClrLst/>
+  </dgm:styleLbl>
+  <dgm:styleLbl name="asst3">
+    <dgm:fillClrLst meth="repeat">
+      <a:schemeClr val="lt1"/>
+    </dgm:fillClrLst>
+    <dgm:linClrLst meth="repeat">
+      <a:schemeClr val="accent5">
+        <a:shade val="80000"/>
+      </a:schemeClr>
+    </dgm:linClrLst>
+    <dgm:effectClrLst/>
+    <dgm:txLinClrLst/>
+    <dgm:txFillClrLst meth="repeat">
+      <a:schemeClr val="dk1"/>
+    </dgm:txFillClrLst>
+    <dgm:txEffectClrLst/>
+  </dgm:styleLbl>
+  <dgm:styleLbl name="asst4">
+    <dgm:fillClrLst meth="repeat">
+      <a:schemeClr val="lt1"/>
+    </dgm:fillClrLst>
+    <dgm:linClrLst meth="repeat">
+      <a:schemeClr val="accent5">
+        <a:shade val="80000"/>
+      </a:schemeClr>
+    </dgm:linClrLst>
+    <dgm:effectClrLst/>
+    <dgm:txLinClrLst/>
+    <dgm:txFillClrLst meth="repeat">
+      <a:schemeClr val="dk1"/>
+    </dgm:txFillClrLst>
+    <dgm:txEffectClrLst/>
+  </dgm:styleLbl>
+  <dgm:styleLbl name="parChTrans2D1">
+    <dgm:fillClrLst meth="repeat">
+      <a:schemeClr val="accent5">
+        <a:tint val="60000"/>
+      </a:schemeClr>
+    </dgm:fillClrLst>
+    <dgm:linClrLst meth="repeat">
+      <a:schemeClr val="accent5">
+        <a:tint val="60000"/>
+      </a:schemeClr>
+    </dgm:linClrLst>
+    <dgm:effectClrLst/>
+    <dgm:txLinClrLst/>
+    <dgm:txFillClrLst/>
+    <dgm:txEffectClrLst/>
+  </dgm:styleLbl>
+  <dgm:styleLbl name="parChTrans2D2">
+    <dgm:fillClrLst meth="repeat">
+      <a:schemeClr val="accent5"/>
+    </dgm:fillClrLst>
+    <dgm:linClrLst meth="repeat">
+      <a:schemeClr val="accent5"/>
+    </dgm:linClrLst>
+    <dgm:effectClrLst/>
+    <dgm:txLinClrLst/>
+    <dgm:txFillClrLst/>
+    <dgm:txEffectClrLst/>
+  </dgm:styleLbl>
+  <dgm:styleLbl name="parChTrans2D3">
+    <dgm:fillClrLst meth="repeat">
+      <a:schemeClr val="accent5"/>
+    </dgm:fillClrLst>
+    <dgm:linClrLst meth="repeat">
+      <a:schemeClr val="accent5"/>
+    </dgm:linClrLst>
+    <dgm:effectClrLst/>
+    <dgm:txLinClrLst/>
+    <dgm:txFillClrLst/>
+    <dgm:txEffectClrLst/>
+  </dgm:styleLbl>
+  <dgm:styleLbl name="parChTrans2D4">
+    <dgm:fillClrLst meth="repeat">
+      <a:schemeClr val="accent5"/>
+    </dgm:fillClrLst>
+    <dgm:linClrLst meth="repeat">
+      <a:schemeClr val="accent5"/>
+    </dgm:linClrLst>
+    <dgm:effectClrLst/>
+    <dgm:txLinClrLst/>
+    <dgm:txFillClrLst meth="repeat">
+      <a:schemeClr val="lt1"/>
+    </dgm:txFillClrLst>
+    <dgm:txEffectClrLst/>
+  </dgm:styleLbl>
+  <dgm:styleLbl name="parChTrans1D1">
+    <dgm:fillClrLst meth="repeat">
+      <a:schemeClr val="accent5"/>
+    </dgm:fillClrLst>
+    <dgm:linClrLst meth="repeat">
+      <a:schemeClr val="accent5">
+        <a:shade val="60000"/>
+      </a:schemeClr>
+    </dgm:linClrLst>
+    <dgm:effectClrLst/>
+    <dgm:txLinClrLst/>
+    <dgm:txFillClrLst meth="repeat">
+      <a:schemeClr val="tx1"/>
+    </dgm:txFillClrLst>
+    <dgm:txEffectClrLst/>
+  </dgm:styleLbl>
+  <dgm:styleLbl name="parChTrans1D2">
+    <dgm:fillClrLst meth="repeat">
+      <a:schemeClr val="accent5"/>
+    </dgm:fillClrLst>
+    <dgm:linClrLst meth="repeat">
+      <a:schemeClr val="accent5">
+        <a:shade val="60000"/>
+      </a:schemeClr>
+    </dgm:linClrLst>
+    <dgm:effectClrLst/>
+    <dgm:txLinClrLst/>
+    <dgm:txFillClrLst meth="repeat">
+      <a:schemeClr val="tx1"/>
+    </dgm:txFillClrLst>
+    <dgm:txEffectClrLst/>
+  </dgm:styleLbl>
+  <dgm:styleLbl name="parChTrans1D3">
+    <dgm:fillClrLst meth="repeat">
+      <a:schemeClr val="accent5"/>
+    </dgm:fillClrLst>
+    <dgm:linClrLst meth="repeat">
+      <a:schemeClr val="accent5">
+        <a:shade val="80000"/>
+      </a:schemeClr>
+    </dgm:linClrLst>
+    <dgm:effectClrLst/>
+    <dgm:txLinClrLst/>
+    <dgm:txFillClrLst meth="repeat">
+      <a:schemeClr val="tx1"/>
+    </dgm:txFillClrLst>
+    <dgm:txEffectClrLst/>
+  </dgm:styleLbl>
+  <dgm:styleLbl name="parChTrans1D4">
+    <dgm:fillClrLst meth="repeat">
+      <a:schemeClr val="accent5"/>
+    </dgm:fillClrLst>
+    <dgm:linClrLst meth="repeat">
+      <a:schemeClr val="accent5">
+        <a:shade val="80000"/>
+      </a:schemeClr>
+    </dgm:linClrLst>
+    <dgm:effectClrLst/>
+    <dgm:txLinClrLst/>
+    <dgm:txFillClrLst meth="repeat">
+      <a:schemeClr val="tx1"/>
+    </dgm:txFillClrLst>
+    <dgm:txEffectClrLst/>
+  </dgm:styleLbl>
+  <dgm:styleLbl name="fgAcc1">
+    <dgm:fillClrLst meth="repeat">
+      <a:schemeClr val="accent5">
+        <a:alpha val="90000"/>
+        <a:tint val="40000"/>
+      </a:schemeClr>
+    </dgm:fillClrLst>
+    <dgm:linClrLst meth="repeat">
+      <a:schemeClr val="accent5"/>
+    </dgm:linClrLst>
+    <dgm:effectClrLst/>
+    <dgm:txLinClrLst/>
+    <dgm:txFillClrLst meth="repeat">
+      <a:schemeClr val="dk1"/>
+    </dgm:txFillClrLst>
+    <dgm:txEffectClrLst/>
+  </dgm:styleLbl>
+  <dgm:styleLbl name="conFgAcc1">
+    <dgm:fillClrLst meth="repeat">
+      <a:schemeClr val="accent5">
+        <a:alpha val="90000"/>
+        <a:tint val="40000"/>
+      </a:schemeClr>
+    </dgm:fillClrLst>
+    <dgm:linClrLst meth="repeat">
+      <a:schemeClr val="accent5"/>
+    </dgm:linClrLst>
+    <dgm:effectClrLst/>
+    <dgm:txLinClrLst/>
+    <dgm:txFillClrLst meth="repeat">
+      <a:schemeClr val="dk1"/>
+    </dgm:txFillClrLst>
+    <dgm:txEffectClrLst/>
+  </dgm:styleLbl>
+  <dgm:styleLbl name="alignAcc1">
+    <dgm:fillClrLst meth="repeat">
+      <a:schemeClr val="accent5">
+        <a:alpha val="90000"/>
+        <a:tint val="40000"/>
+      </a:schemeClr>
+    </dgm:fillClrLst>
+    <dgm:linClrLst meth="repeat">
+      <a:schemeClr val="accent5"/>
+    </dgm:linClrLst>
+    <dgm:effectClrLst/>
+    <dgm:txLinClrLst/>
+    <dgm:txFillClrLst meth="repeat">
+      <a:schemeClr val="dk1"/>
+    </dgm:txFillClrLst>
+    <dgm:txEffectClrLst/>
+  </dgm:styleLbl>
+  <dgm:styleLbl name="trAlignAcc1">
+    <dgm:fillClrLst meth="repeat">
+      <a:schemeClr val="accent5">
+        <a:alpha val="40000"/>
+        <a:tint val="40000"/>
+      </a:schemeClr>
+    </dgm:fillClrLst>
+    <dgm:linClrLst meth="repeat">
+      <a:schemeClr val="accent5"/>
+    </dgm:linClrLst>
+    <dgm:effectClrLst/>
+    <dgm:txLinClrLst/>
+    <dgm:txFillClrLst meth="repeat">
+      <a:schemeClr val="dk1"/>
+    </dgm:txFillClrLst>
+    <dgm:txEffectClrLst/>
+  </dgm:styleLbl>
+  <dgm:styleLbl name="bgAcc1">
+    <dgm:fillClrLst meth="repeat">
+      <a:schemeClr val="accent5">
+        <a:alpha val="90000"/>
+        <a:tint val="40000"/>
+      </a:schemeClr>
+    </dgm:fillClrLst>
+    <dgm:linClrLst meth="repeat">
+      <a:schemeClr val="accent5"/>
+    </dgm:linClrLst>
+    <dgm:effectClrLst/>
+    <dgm:txLinClrLst/>
+    <dgm:txFillClrLst meth="repeat">
+      <a:schemeClr val="dk1"/>
+    </dgm:txFillClrLst>
+    <dgm:txEffectClrLst/>
+  </dgm:styleLbl>
+  <dgm:styleLbl name="solidFgAcc1">
+    <dgm:fillClrLst meth="repeat">
+      <a:schemeClr val="lt1"/>
+    </dgm:fillClrLst>
+    <dgm:linClrLst meth="repeat">
+      <a:schemeClr val="accent5"/>
+    </dgm:linClrLst>
+    <dgm:effectClrLst/>
+    <dgm:txLinClrLst/>
+    <dgm:txFillClrLst meth="repeat">
+      <a:schemeClr val="dk1"/>
+    </dgm:txFillClrLst>
+    <dgm:txEffectClrLst/>
+  </dgm:styleLbl>
+  <dgm:styleLbl name="solidAlignAcc1">
+    <dgm:fillClrLst meth="repeat">
+      <a:schemeClr val="lt1"/>
+    </dgm:fillClrLst>
+    <dgm:linClrLst meth="repeat">
+      <a:schemeClr val="accent5"/>
+    </dgm:linClrLst>
+    <dgm:effectClrLst/>
+    <dgm:txLinClrLst/>
+    <dgm:txFillClrLst meth="repeat">
+      <a:schemeClr val="dk1"/>
+    </dgm:txFillClrLst>
+    <dgm:txEffectClrLst/>
+  </dgm:styleLbl>
+  <dgm:styleLbl name="solidBgAcc1">
+    <dgm:fillClrLst meth="repeat">
+      <a:schemeClr val="lt1"/>
+    </dgm:fillClrLst>
+    <dgm:linClrLst meth="repeat">
+      <a:schemeClr val="accent5"/>
+    </dgm:linClrLst>
+    <dgm:effectClrLst/>
+    <dgm:txLinClrLst/>
+    <dgm:txFillClrLst meth="repeat">
+      <a:schemeClr val="dk1"/>
+    </dgm:txFillClrLst>
+    <dgm:txEffectClrLst/>
+  </dgm:styleLbl>
+  <dgm:styleLbl name="fgAccFollowNode1">
+    <dgm:fillClrLst meth="repeat">
+      <a:schemeClr val="lt1">
+        <a:alpha val="90000"/>
+        <a:tint val="40000"/>
+      </a:schemeClr>
+    </dgm:fillClrLst>
+    <dgm:linClrLst meth="repeat">
+      <a:schemeClr val="accent5">
+        <a:alpha val="90000"/>
+      </a:schemeClr>
+    </dgm:linClrLst>
+    <dgm:effectClrLst/>
+    <dgm:txLinClrLst/>
+    <dgm:txFillClrLst meth="repeat">
+      <a:schemeClr val="dk1"/>
+    </dgm:txFillClrLst>
+    <dgm:txEffectClrLst/>
+  </dgm:styleLbl>
+  <dgm:styleLbl name="alignAccFollowNode1">
+    <dgm:fillClrLst meth="repeat">
+      <a:schemeClr val="lt1">
+        <a:alpha val="90000"/>
+        <a:tint val="40000"/>
+      </a:schemeClr>
+    </dgm:fillClrLst>
+    <dgm:linClrLst meth="repeat">
+      <a:schemeClr val="accent5">
+        <a:alpha val="90000"/>
+      </a:schemeClr>
+    </dgm:linClrLst>
+    <dgm:effectClrLst/>
+    <dgm:txLinClrLst/>
+    <dgm:txFillClrLst meth="repeat">
+      <a:schemeClr val="dk1"/>
+    </dgm:txFillClrLst>
+    <dgm:txEffectClrLst/>
+  </dgm:styleLbl>
+  <dgm:styleLbl name="bgAccFollowNode1">
+    <dgm:fillClrLst meth="repeat">
+      <a:schemeClr val="lt1">
+        <a:alpha val="90000"/>
+        <a:tint val="40000"/>
+      </a:schemeClr>
+    </dgm:fillClrLst>
+    <dgm:linClrLst meth="repeat">
+      <a:schemeClr val="accent5">
+        <a:alpha val="90000"/>
+      </a:schemeClr>
+    </dgm:linClrLst>
+    <dgm:effectClrLst/>
+    <dgm:txLinClrLst/>
+    <dgm:txFillClrLst meth="repeat">
+      <a:schemeClr val="dk1"/>
+    </dgm:txFillClrLst>
+    <dgm:txEffectClrLst/>
+  </dgm:styleLbl>
+  <dgm:styleLbl name="fgAcc0">
+    <dgm:fillClrLst meth="repeat">
+      <a:schemeClr val="accent5">
+        <a:alpha val="90000"/>
+        <a:tint val="40000"/>
+      </a:schemeClr>
+    </dgm:fillClrLst>
+    <dgm:linClrLst meth="repeat">
+      <a:schemeClr val="accent5"/>
+    </dgm:linClrLst>
+    <dgm:effectClrLst/>
+    <dgm:txLinClrLst/>
+    <dgm:txFillClrLst meth="repeat">
+      <a:schemeClr val="dk1"/>
+    </dgm:txFillClrLst>
+    <dgm:txEffectClrLst/>
+  </dgm:styleLbl>
+  <dgm:styleLbl name="fgAcc2">
+    <dgm:fillClrLst meth="repeat">
+      <a:schemeClr val="accent5">
+        <a:alpha val="90000"/>
+        <a:tint val="40000"/>
+      </a:schemeClr>
+    </dgm:fillClrLst>
+    <dgm:linClrLst meth="repeat">
+      <a:schemeClr val="accent5"/>
+    </dgm:linClrLst>
+    <dgm:effectClrLst/>
+    <dgm:txLinClrLst/>
+    <dgm:txFillClrLst meth="repeat">
+      <a:schemeClr val="dk1"/>
+    </dgm:txFillClrLst>
+    <dgm:txEffectClrLst/>
+  </dgm:styleLbl>
+  <dgm:styleLbl name="fgAcc3">
+    <dgm:fillClrLst meth="repeat">
+      <a:schemeClr val="accent5">
+        <a:alpha val="90000"/>
+        <a:tint val="40000"/>
+      </a:schemeClr>
+    </dgm:fillClrLst>
+    <dgm:linClrLst meth="repeat">
+      <a:schemeClr val="accent5"/>
+    </dgm:linClrLst>
+    <dgm:effectClrLst/>
+    <dgm:txLinClrLst/>
+    <dgm:txFillClrLst meth="repeat">
+      <a:schemeClr val="dk1"/>
+    </dgm:txFillClrLst>
+    <dgm:txEffectClrLst/>
+  </dgm:styleLbl>
+  <dgm:styleLbl name="fgAcc4">
+    <dgm:fillClrLst meth="repeat">
+      <a:schemeClr val="accent5">
+        <a:alpha val="90000"/>
+        <a:tint val="40000"/>
+      </a:schemeClr>
+    </dgm:fillClrLst>
+    <dgm:linClrLst meth="repeat">
+      <a:schemeClr val="accent5"/>
+    </dgm:linClrLst>
+    <dgm:effectClrLst/>
+    <dgm:txLinClrLst/>
+    <dgm:txFillClrLst meth="repeat">
+      <a:schemeClr val="dk1"/>
+    </dgm:txFillClrLst>
+    <dgm:txEffectClrLst/>
+  </dgm:styleLbl>
+  <dgm:styleLbl name="bgShp">
+    <dgm:fillClrLst meth="repeat">
+      <a:schemeClr val="accent5">
+        <a:tint val="40000"/>
+      </a:schemeClr>
+    </dgm:fillClrLst>
+    <dgm:linClrLst meth="repeat">
+      <a:schemeClr val="accent5"/>
+    </dgm:linClrLst>
+    <dgm:effectClrLst/>
+    <dgm:txLinClrLst/>
+    <dgm:txFillClrLst meth="repeat">
+      <a:schemeClr val="dk1"/>
+    </dgm:txFillClrLst>
+    <dgm:txEffectClrLst/>
+  </dgm:styleLbl>
+  <dgm:styleLbl name="dkBgShp">
+    <dgm:fillClrLst meth="repeat">
+      <a:schemeClr val="accent5">
+        <a:shade val="80000"/>
+      </a:schemeClr>
+    </dgm:fillClrLst>
+    <dgm:linClrLst meth="repeat">
+      <a:schemeClr val="accent5"/>
+    </dgm:linClrLst>
+    <dgm:effectClrLst/>
+    <dgm:txLinClrLst/>
+    <dgm:txFillClrLst meth="repeat">
+      <a:schemeClr val="lt1"/>
+    </dgm:txFillClrLst>
+    <dgm:txEffectClrLst/>
+  </dgm:styleLbl>
+  <dgm:styleLbl name="trBgShp">
+    <dgm:fillClrLst meth="repeat">
+      <a:schemeClr val="accent5">
+        <a:tint val="50000"/>
+        <a:alpha val="40000"/>
+      </a:schemeClr>
+    </dgm:fillClrLst>
+    <dgm:linClrLst meth="repeat">
+      <a:schemeClr val="accent5"/>
+    </dgm:linClrLst>
+    <dgm:effectClrLst/>
+    <dgm:txLinClrLst/>
+    <dgm:txFillClrLst meth="repeat">
+      <a:schemeClr val="lt1"/>
+    </dgm:txFillClrLst>
+    <dgm:txEffectClrLst/>
+  </dgm:styleLbl>
+  <dgm:styleLbl name="fgShp">
+    <dgm:fillClrLst meth="repeat">
+      <a:schemeClr val="accent5">
+        <a:tint val="60000"/>
+      </a:schemeClr>
+    </dgm:fillClrLst>
+    <dgm:linClrLst meth="repeat">
+      <a:schemeClr val="lt1"/>
+    </dgm:linClrLst>
+    <dgm:effectClrLst/>
+    <dgm:txLinClrLst/>
+    <dgm:txFillClrLst meth="repeat">
+      <a:schemeClr val="dk1"/>
+    </dgm:txFillClrLst>
+    <dgm:txEffectClrLst/>
+  </dgm:styleLbl>
+  <dgm:styleLbl name="revTx">
+    <dgm:fillClrLst meth="repeat">
+      <a:schemeClr val="lt1">
+        <a:alpha val="0"/>
+      </a:schemeClr>
+    </dgm:fillClrLst>
+    <dgm:linClrLst meth="repeat">
+      <a:schemeClr val="dk1">
+        <a:alpha val="0"/>
+      </a:schemeClr>
+    </dgm:linClrLst>
+    <dgm:effectClrLst/>
+    <dgm:txLinClrLst/>
+    <dgm:txFillClrLst meth="repeat">
+      <a:schemeClr val="tx1"/>
+    </dgm:txFillClrLst>
+    <dgm:txEffectClrLst/>
+  </dgm:styleLbl>
+</dgm:colorsDef>
+</file>
+
+<file path=ppt/diagrams/data1.xml><?xml version="1.0" encoding="utf-8"?>
+<dgm:dataModel xmlns:dgm="http://schemas.openxmlformats.org/drawingml/2006/diagram" xmlns:a="http://schemas.openxmlformats.org/drawingml/2006/main">
+  <dgm:ptLst>
+    <dgm:pt modelId="{5416718E-9A61-4697-BA86-0D85F2D5BEA0}" type="doc">
+      <dgm:prSet loTypeId="urn:microsoft.com/office/officeart/2005/8/layout/vList2" loCatId="list" qsTypeId="urn:microsoft.com/office/officeart/2005/8/quickstyle/simple2" qsCatId="simple" csTypeId="urn:microsoft.com/office/officeart/2005/8/colors/accent5_1" csCatId="accent5" phldr="1"/>
+      <dgm:spPr/>
+      <dgm:t>
+        <a:bodyPr/>
+        <a:lstStyle/>
+        <a:p>
+          <a:endParaRPr lang="en-CH"/>
+        </a:p>
+      </dgm:t>
+    </dgm:pt>
+    <dgm:pt modelId="{18FC1352-A257-4498-86B6-ADE36FE7DB51}">
+      <dgm:prSet phldrT="[Text]"/>
+      <dgm:spPr/>
+      <dgm:t>
+        <a:bodyPr/>
+        <a:lstStyle/>
+        <a:p>
+          <a:r>
+            <a:rPr lang="en-CH" dirty="0">
+              <a:latin typeface="Inter" panose="02000503000000020004" pitchFamily="50" charset="0"/>
+              <a:ea typeface="Inter" panose="02000503000000020004" pitchFamily="50" charset="0"/>
+              <a:cs typeface="Inter" panose="02000503000000020004" pitchFamily="50" charset="0"/>
+            </a:rPr>
+            <a:t>Systematic Characteristics</a:t>
+          </a:r>
+          <a:endParaRPr lang="en-CH" dirty="0"/>
+        </a:p>
+      </dgm:t>
+    </dgm:pt>
+    <dgm:pt modelId="{71BA195C-9FB0-447C-AAF0-F90BDE5C2FAE}" type="parTrans" cxnId="{AEF3F690-55D0-42C3-91CF-F6E042ABBE4C}">
+      <dgm:prSet/>
+      <dgm:spPr/>
+      <dgm:t>
+        <a:bodyPr/>
+        <a:lstStyle/>
+        <a:p>
+          <a:endParaRPr lang="en-CH"/>
+        </a:p>
+      </dgm:t>
+    </dgm:pt>
+    <dgm:pt modelId="{D249E70E-378C-4D78-9638-FB8C20830E85}" type="sibTrans" cxnId="{AEF3F690-55D0-42C3-91CF-F6E042ABBE4C}">
+      <dgm:prSet/>
+      <dgm:spPr/>
+      <dgm:t>
+        <a:bodyPr/>
+        <a:lstStyle/>
+        <a:p>
+          <a:endParaRPr lang="en-CH"/>
+        </a:p>
+      </dgm:t>
+    </dgm:pt>
+    <dgm:pt modelId="{76950C0D-6882-4332-9FD7-64B77779776E}">
+      <dgm:prSet phldrT="[Text]"/>
+      <dgm:spPr/>
+      <dgm:t>
+        <a:bodyPr/>
+        <a:lstStyle/>
+        <a:p>
+          <a:r>
+            <a:rPr lang="en-CH" dirty="0">
+              <a:latin typeface="Inter" panose="02000503000000020004" pitchFamily="50" charset="0"/>
+              <a:ea typeface="Inter" panose="02000503000000020004" pitchFamily="50" charset="0"/>
+              <a:cs typeface="Inter" panose="02000503000000020004" pitchFamily="50" charset="0"/>
+            </a:rPr>
+            <a:t>Generalized Model</a:t>
+          </a:r>
+        </a:p>
+      </dgm:t>
+    </dgm:pt>
+    <dgm:pt modelId="{8CAB11A5-633F-4734-9E20-F2349FC44533}" type="parTrans" cxnId="{18AA5809-1AC5-437F-8C59-58FA2E6A2F9E}">
+      <dgm:prSet/>
+      <dgm:spPr/>
+      <dgm:t>
+        <a:bodyPr/>
+        <a:lstStyle/>
+        <a:p>
+          <a:endParaRPr lang="en-CH"/>
+        </a:p>
+      </dgm:t>
+    </dgm:pt>
+    <dgm:pt modelId="{750EAA83-6D21-402F-8526-4A6746337EFB}" type="sibTrans" cxnId="{18AA5809-1AC5-437F-8C59-58FA2E6A2F9E}">
+      <dgm:prSet/>
+      <dgm:spPr/>
+      <dgm:t>
+        <a:bodyPr/>
+        <a:lstStyle/>
+        <a:p>
+          <a:endParaRPr lang="en-CH"/>
+        </a:p>
+      </dgm:t>
+    </dgm:pt>
+    <dgm:pt modelId="{70B163FE-C643-4166-B706-BC8117226CF0}">
+      <dgm:prSet phldrT="[Text]"/>
+      <dgm:spPr/>
+      <dgm:t>
+        <a:bodyPr/>
+        <a:lstStyle/>
+        <a:p>
+          <a:r>
+            <a:rPr lang="en-CH" dirty="0">
+              <a:latin typeface="Inter" panose="02000503000000020004" pitchFamily="50" charset="0"/>
+              <a:ea typeface="Inter" panose="02000503000000020004" pitchFamily="50" charset="0"/>
+              <a:cs typeface="Inter" panose="02000503000000020004" pitchFamily="50" charset="0"/>
+            </a:rPr>
+            <a:t>Statistical Characteristics</a:t>
+          </a:r>
+        </a:p>
+      </dgm:t>
+    </dgm:pt>
+    <dgm:pt modelId="{BA457E96-8002-4E5C-8641-A2011DD83189}" type="parTrans" cxnId="{F2E565A9-2183-45FD-94C8-58942A11ED15}">
+      <dgm:prSet/>
+      <dgm:spPr/>
+      <dgm:t>
+        <a:bodyPr/>
+        <a:lstStyle/>
+        <a:p>
+          <a:endParaRPr lang="en-CH"/>
+        </a:p>
+      </dgm:t>
+    </dgm:pt>
+    <dgm:pt modelId="{DA102375-637D-46D9-888B-1966B7FB1035}" type="sibTrans" cxnId="{F2E565A9-2183-45FD-94C8-58942A11ED15}">
+      <dgm:prSet/>
+      <dgm:spPr/>
+      <dgm:t>
+        <a:bodyPr/>
+        <a:lstStyle/>
+        <a:p>
+          <a:endParaRPr lang="en-CH"/>
+        </a:p>
+      </dgm:t>
+    </dgm:pt>
+    <dgm:pt modelId="{279246E2-99B2-4F14-8855-AE91B79B3B1A}">
+      <dgm:prSet phldrT="[Text]"/>
+      <dgm:spPr/>
+      <dgm:t>
+        <a:bodyPr/>
+        <a:lstStyle/>
+        <a:p>
+          <a:r>
+            <a:rPr lang="en-CH" dirty="0">
+              <a:latin typeface="Inter" panose="02000503000000020004" pitchFamily="50" charset="0"/>
+              <a:ea typeface="Inter" panose="02000503000000020004" pitchFamily="50" charset="0"/>
+              <a:cs typeface="Inter" panose="02000503000000020004" pitchFamily="50" charset="0"/>
+            </a:rPr>
+            <a:t>Identification of Static Characteristics</a:t>
+          </a:r>
+        </a:p>
+      </dgm:t>
+    </dgm:pt>
+    <dgm:pt modelId="{D916BD49-9876-4A8C-9F95-BEDD8F98C07D}" type="parTrans" cxnId="{3C385124-3A5F-4135-8D22-426B08B2BD0D}">
+      <dgm:prSet/>
+      <dgm:spPr/>
+      <dgm:t>
+        <a:bodyPr/>
+        <a:lstStyle/>
+        <a:p>
+          <a:endParaRPr lang="en-CH"/>
+        </a:p>
+      </dgm:t>
+    </dgm:pt>
+    <dgm:pt modelId="{9EAC4B58-24BC-42C9-A432-EA5AC5CE7A0A}" type="sibTrans" cxnId="{3C385124-3A5F-4135-8D22-426B08B2BD0D}">
+      <dgm:prSet/>
+      <dgm:spPr/>
+      <dgm:t>
+        <a:bodyPr/>
+        <a:lstStyle/>
+        <a:p>
+          <a:endParaRPr lang="en-CH"/>
+        </a:p>
+      </dgm:t>
+    </dgm:pt>
+    <dgm:pt modelId="{505EA529-68F5-4F0E-89ED-292E853EA805}" type="pres">
+      <dgm:prSet presAssocID="{5416718E-9A61-4697-BA86-0D85F2D5BEA0}" presName="linear" presStyleCnt="0">
+        <dgm:presLayoutVars>
+          <dgm:animLvl val="lvl"/>
+          <dgm:resizeHandles val="exact"/>
+        </dgm:presLayoutVars>
+      </dgm:prSet>
+      <dgm:spPr/>
+    </dgm:pt>
+    <dgm:pt modelId="{2937A3F7-8EA2-4585-9CA9-CD672D3B334D}" type="pres">
+      <dgm:prSet presAssocID="{18FC1352-A257-4498-86B6-ADE36FE7DB51}" presName="parentText" presStyleLbl="node1" presStyleIdx="0" presStyleCnt="4">
+        <dgm:presLayoutVars>
+          <dgm:chMax val="0"/>
+          <dgm:bulletEnabled val="1"/>
+        </dgm:presLayoutVars>
+      </dgm:prSet>
+      <dgm:spPr/>
+    </dgm:pt>
+    <dgm:pt modelId="{E86D96F3-BEA2-4FF8-8800-BDC5C5C013FA}" type="pres">
+      <dgm:prSet presAssocID="{D249E70E-378C-4D78-9638-FB8C20830E85}" presName="spacer" presStyleCnt="0"/>
+      <dgm:spPr/>
+    </dgm:pt>
+    <dgm:pt modelId="{A8BF1EEF-2BD5-4715-BDA2-84F2C766B6CF}" type="pres">
+      <dgm:prSet presAssocID="{76950C0D-6882-4332-9FD7-64B77779776E}" presName="parentText" presStyleLbl="node1" presStyleIdx="1" presStyleCnt="4">
+        <dgm:presLayoutVars>
+          <dgm:chMax val="0"/>
+          <dgm:bulletEnabled val="1"/>
+        </dgm:presLayoutVars>
+      </dgm:prSet>
+      <dgm:spPr/>
+    </dgm:pt>
+    <dgm:pt modelId="{99430AD3-305A-44E4-AACE-B548836D0748}" type="pres">
+      <dgm:prSet presAssocID="{750EAA83-6D21-402F-8526-4A6746337EFB}" presName="spacer" presStyleCnt="0"/>
+      <dgm:spPr/>
+    </dgm:pt>
+    <dgm:pt modelId="{FE080762-F35C-412D-845B-319C4A14A12D}" type="pres">
+      <dgm:prSet presAssocID="{70B163FE-C643-4166-B706-BC8117226CF0}" presName="parentText" presStyleLbl="node1" presStyleIdx="2" presStyleCnt="4">
+        <dgm:presLayoutVars>
+          <dgm:chMax val="0"/>
+          <dgm:bulletEnabled val="1"/>
+        </dgm:presLayoutVars>
+      </dgm:prSet>
+      <dgm:spPr/>
+    </dgm:pt>
+    <dgm:pt modelId="{5798F9EB-D2B6-452E-AF69-2B0B33D3918A}" type="pres">
+      <dgm:prSet presAssocID="{DA102375-637D-46D9-888B-1966B7FB1035}" presName="spacer" presStyleCnt="0"/>
+      <dgm:spPr/>
+    </dgm:pt>
+    <dgm:pt modelId="{9728DBE3-27A7-423C-A0FC-CB3192CF788F}" type="pres">
+      <dgm:prSet presAssocID="{279246E2-99B2-4F14-8855-AE91B79B3B1A}" presName="parentText" presStyleLbl="node1" presStyleIdx="3" presStyleCnt="4">
+        <dgm:presLayoutVars>
+          <dgm:chMax val="0"/>
+          <dgm:bulletEnabled val="1"/>
+        </dgm:presLayoutVars>
+      </dgm:prSet>
+      <dgm:spPr/>
+    </dgm:pt>
+  </dgm:ptLst>
+  <dgm:cxnLst>
+    <dgm:cxn modelId="{18AA5809-1AC5-437F-8C59-58FA2E6A2F9E}" srcId="{5416718E-9A61-4697-BA86-0D85F2D5BEA0}" destId="{76950C0D-6882-4332-9FD7-64B77779776E}" srcOrd="1" destOrd="0" parTransId="{8CAB11A5-633F-4734-9E20-F2349FC44533}" sibTransId="{750EAA83-6D21-402F-8526-4A6746337EFB}"/>
+    <dgm:cxn modelId="{3C385124-3A5F-4135-8D22-426B08B2BD0D}" srcId="{5416718E-9A61-4697-BA86-0D85F2D5BEA0}" destId="{279246E2-99B2-4F14-8855-AE91B79B3B1A}" srcOrd="3" destOrd="0" parTransId="{D916BD49-9876-4A8C-9F95-BEDD8F98C07D}" sibTransId="{9EAC4B58-24BC-42C9-A432-EA5AC5CE7A0A}"/>
+    <dgm:cxn modelId="{09C63C6B-C5F6-44AF-972A-0247BEB4B580}" type="presOf" srcId="{76950C0D-6882-4332-9FD7-64B77779776E}" destId="{A8BF1EEF-2BD5-4715-BDA2-84F2C766B6CF}" srcOrd="0" destOrd="0" presId="urn:microsoft.com/office/officeart/2005/8/layout/vList2"/>
+    <dgm:cxn modelId="{30EC788F-6F00-4A9C-9709-97A98C362BFC}" type="presOf" srcId="{18FC1352-A257-4498-86B6-ADE36FE7DB51}" destId="{2937A3F7-8EA2-4585-9CA9-CD672D3B334D}" srcOrd="0" destOrd="0" presId="urn:microsoft.com/office/officeart/2005/8/layout/vList2"/>
+    <dgm:cxn modelId="{AEF3F690-55D0-42C3-91CF-F6E042ABBE4C}" srcId="{5416718E-9A61-4697-BA86-0D85F2D5BEA0}" destId="{18FC1352-A257-4498-86B6-ADE36FE7DB51}" srcOrd="0" destOrd="0" parTransId="{71BA195C-9FB0-447C-AAF0-F90BDE5C2FAE}" sibTransId="{D249E70E-378C-4D78-9638-FB8C20830E85}"/>
+    <dgm:cxn modelId="{F2E565A9-2183-45FD-94C8-58942A11ED15}" srcId="{5416718E-9A61-4697-BA86-0D85F2D5BEA0}" destId="{70B163FE-C643-4166-B706-BC8117226CF0}" srcOrd="2" destOrd="0" parTransId="{BA457E96-8002-4E5C-8641-A2011DD83189}" sibTransId="{DA102375-637D-46D9-888B-1966B7FB1035}"/>
+    <dgm:cxn modelId="{CE0990AB-5C26-4809-8377-0E377599FA51}" type="presOf" srcId="{279246E2-99B2-4F14-8855-AE91B79B3B1A}" destId="{9728DBE3-27A7-423C-A0FC-CB3192CF788F}" srcOrd="0" destOrd="0" presId="urn:microsoft.com/office/officeart/2005/8/layout/vList2"/>
+    <dgm:cxn modelId="{E4C691F2-AF7C-4110-849D-75ACCFA4C560}" type="presOf" srcId="{70B163FE-C643-4166-B706-BC8117226CF0}" destId="{FE080762-F35C-412D-845B-319C4A14A12D}" srcOrd="0" destOrd="0" presId="urn:microsoft.com/office/officeart/2005/8/layout/vList2"/>
+    <dgm:cxn modelId="{7EE544F4-4B1F-4BCC-8722-19E255A8D104}" type="presOf" srcId="{5416718E-9A61-4697-BA86-0D85F2D5BEA0}" destId="{505EA529-68F5-4F0E-89ED-292E853EA805}" srcOrd="0" destOrd="0" presId="urn:microsoft.com/office/officeart/2005/8/layout/vList2"/>
+    <dgm:cxn modelId="{EC5E4D0E-A1F9-42CD-B060-1A1B7600128A}" type="presParOf" srcId="{505EA529-68F5-4F0E-89ED-292E853EA805}" destId="{2937A3F7-8EA2-4585-9CA9-CD672D3B334D}" srcOrd="0" destOrd="0" presId="urn:microsoft.com/office/officeart/2005/8/layout/vList2"/>
+    <dgm:cxn modelId="{695CFFE7-35A1-4DA6-8B3A-FE8B33CC3000}" type="presParOf" srcId="{505EA529-68F5-4F0E-89ED-292E853EA805}" destId="{E86D96F3-BEA2-4FF8-8800-BDC5C5C013FA}" srcOrd="1" destOrd="0" presId="urn:microsoft.com/office/officeart/2005/8/layout/vList2"/>
+    <dgm:cxn modelId="{CD4BA802-96F9-4CD9-9A38-09BD81AA1F6D}" type="presParOf" srcId="{505EA529-68F5-4F0E-89ED-292E853EA805}" destId="{A8BF1EEF-2BD5-4715-BDA2-84F2C766B6CF}" srcOrd="2" destOrd="0" presId="urn:microsoft.com/office/officeart/2005/8/layout/vList2"/>
+    <dgm:cxn modelId="{E99C90F8-F29F-48A9-B248-B7DF2CE64063}" type="presParOf" srcId="{505EA529-68F5-4F0E-89ED-292E853EA805}" destId="{99430AD3-305A-44E4-AACE-B548836D0748}" srcOrd="3" destOrd="0" presId="urn:microsoft.com/office/officeart/2005/8/layout/vList2"/>
+    <dgm:cxn modelId="{D5A6E590-2A81-43FF-A550-6033729CE3F3}" type="presParOf" srcId="{505EA529-68F5-4F0E-89ED-292E853EA805}" destId="{FE080762-F35C-412D-845B-319C4A14A12D}" srcOrd="4" destOrd="0" presId="urn:microsoft.com/office/officeart/2005/8/layout/vList2"/>
+    <dgm:cxn modelId="{20D4E3EF-67DC-4B80-A8EA-27CDA3BEAED1}" type="presParOf" srcId="{505EA529-68F5-4F0E-89ED-292E853EA805}" destId="{5798F9EB-D2B6-452E-AF69-2B0B33D3918A}" srcOrd="5" destOrd="0" presId="urn:microsoft.com/office/officeart/2005/8/layout/vList2"/>
+    <dgm:cxn modelId="{887FB32B-5D70-487D-8972-C900DA1EF26C}" type="presParOf" srcId="{505EA529-68F5-4F0E-89ED-292E853EA805}" destId="{9728DBE3-27A7-423C-A0FC-CB3192CF788F}" srcOrd="6" destOrd="0" presId="urn:microsoft.com/office/officeart/2005/8/layout/vList2"/>
+  </dgm:cxnLst>
+  <dgm:bg/>
+  <dgm:whole/>
+  <dgm:extLst>
+    <a:ext uri="http://schemas.microsoft.com/office/drawing/2008/diagram">
+      <dsp:dataModelExt xmlns:dsp="http://schemas.microsoft.com/office/drawing/2008/diagram" relId="rId6" minVer="http://schemas.openxmlformats.org/drawingml/2006/diagram"/>
+    </a:ext>
+  </dgm:extLst>
+</dgm:dataModel>
+</file>
+
+<file path=ppt/diagrams/drawing1.xml><?xml version="1.0" encoding="utf-8"?>
+<dsp:drawing xmlns:dgm="http://schemas.openxmlformats.org/drawingml/2006/diagram" xmlns:dsp="http://schemas.microsoft.com/office/drawing/2008/diagram" xmlns:a="http://schemas.openxmlformats.org/drawingml/2006/main">
+  <dsp:spTree>
+    <dsp:nvGrpSpPr>
+      <dsp:cNvPr id="0" name=""/>
+      <dsp:cNvGrpSpPr/>
+    </dsp:nvGrpSpPr>
+    <dsp:grpSpPr/>
+    <dsp:sp modelId="{2937A3F7-8EA2-4585-9CA9-CD672D3B334D}">
+      <dsp:nvSpPr>
+        <dsp:cNvPr id="0" name=""/>
+        <dsp:cNvSpPr/>
+      </dsp:nvSpPr>
+      <dsp:spPr>
+        <a:xfrm>
+          <a:off x="0" y="64062"/>
+          <a:ext cx="8423275" cy="859949"/>
+        </a:xfrm>
+        <a:prstGeom prst="roundRect">
+          <a:avLst/>
+        </a:prstGeom>
+        <a:solidFill>
+          <a:schemeClr val="lt1">
+            <a:hueOff val="0"/>
+            <a:satOff val="0"/>
+            <a:lumOff val="0"/>
+            <a:alphaOff val="0"/>
+          </a:schemeClr>
+        </a:solidFill>
+        <a:ln w="19050" cap="flat" cmpd="sng" algn="ctr">
+          <a:solidFill>
+            <a:schemeClr val="accent5">
+              <a:shade val="80000"/>
+              <a:hueOff val="0"/>
+              <a:satOff val="0"/>
+              <a:lumOff val="0"/>
+              <a:alphaOff val="0"/>
+            </a:schemeClr>
+          </a:solidFill>
+          <a:prstDash val="solid"/>
+          <a:miter lim="800000"/>
+        </a:ln>
+        <a:effectLst/>
+      </dsp:spPr>
+      <dsp:style>
+        <a:lnRef idx="3">
+          <a:scrgbClr r="0" g="0" b="0"/>
+        </a:lnRef>
+        <a:fillRef idx="1">
+          <a:scrgbClr r="0" g="0" b="0"/>
+        </a:fillRef>
+        <a:effectRef idx="1">
+          <a:scrgbClr r="0" g="0" b="0"/>
+        </a:effectRef>
+        <a:fontRef idx="minor">
+          <a:schemeClr val="lt1"/>
+        </a:fontRef>
+      </dsp:style>
+      <dsp:txBody>
+        <a:bodyPr spcFirstLastPara="0" vert="horz" wrap="square" lIns="133350" tIns="133350" rIns="133350" bIns="133350" numCol="1" spcCol="1270" anchor="ctr" anchorCtr="0">
+          <a:noAutofit/>
+        </a:bodyPr>
+        <a:lstStyle/>
+        <a:p>
+          <a:pPr marL="0" lvl="0" indent="0" algn="l" defTabSz="1555750">
+            <a:lnSpc>
+              <a:spcPct val="90000"/>
+            </a:lnSpc>
+            <a:spcBef>
+              <a:spcPct val="0"/>
+            </a:spcBef>
+            <a:spcAft>
+              <a:spcPct val="35000"/>
+            </a:spcAft>
+            <a:buNone/>
+          </a:pPr>
+          <a:r>
+            <a:rPr lang="en-CH" sz="3500" kern="1200" dirty="0">
+              <a:latin typeface="Inter" panose="02000503000000020004" pitchFamily="50" charset="0"/>
+              <a:ea typeface="Inter" panose="02000503000000020004" pitchFamily="50" charset="0"/>
+              <a:cs typeface="Inter" panose="02000503000000020004" pitchFamily="50" charset="0"/>
+            </a:rPr>
+            <a:t>Systematic Characteristics</a:t>
+          </a:r>
+          <a:endParaRPr lang="en-CH" sz="3500" kern="1200" dirty="0"/>
+        </a:p>
+      </dsp:txBody>
+      <dsp:txXfrm>
+        <a:off x="41979" y="106041"/>
+        <a:ext cx="8339317" cy="775991"/>
+      </dsp:txXfrm>
+    </dsp:sp>
+    <dsp:sp modelId="{A8BF1EEF-2BD5-4715-BDA2-84F2C766B6CF}">
+      <dsp:nvSpPr>
+        <dsp:cNvPr id="0" name=""/>
+        <dsp:cNvSpPr/>
+      </dsp:nvSpPr>
+      <dsp:spPr>
+        <a:xfrm>
+          <a:off x="0" y="1024812"/>
+          <a:ext cx="8423275" cy="859949"/>
+        </a:xfrm>
+        <a:prstGeom prst="roundRect">
+          <a:avLst/>
+        </a:prstGeom>
+        <a:solidFill>
+          <a:schemeClr val="lt1">
+            <a:hueOff val="0"/>
+            <a:satOff val="0"/>
+            <a:lumOff val="0"/>
+            <a:alphaOff val="0"/>
+          </a:schemeClr>
+        </a:solidFill>
+        <a:ln w="19050" cap="flat" cmpd="sng" algn="ctr">
+          <a:solidFill>
+            <a:schemeClr val="accent5">
+              <a:shade val="80000"/>
+              <a:hueOff val="0"/>
+              <a:satOff val="0"/>
+              <a:lumOff val="0"/>
+              <a:alphaOff val="0"/>
+            </a:schemeClr>
+          </a:solidFill>
+          <a:prstDash val="solid"/>
+          <a:miter lim="800000"/>
+        </a:ln>
+        <a:effectLst/>
+      </dsp:spPr>
+      <dsp:style>
+        <a:lnRef idx="3">
+          <a:scrgbClr r="0" g="0" b="0"/>
+        </a:lnRef>
+        <a:fillRef idx="1">
+          <a:scrgbClr r="0" g="0" b="0"/>
+        </a:fillRef>
+        <a:effectRef idx="1">
+          <a:scrgbClr r="0" g="0" b="0"/>
+        </a:effectRef>
+        <a:fontRef idx="minor">
+          <a:schemeClr val="lt1"/>
+        </a:fontRef>
+      </dsp:style>
+      <dsp:txBody>
+        <a:bodyPr spcFirstLastPara="0" vert="horz" wrap="square" lIns="133350" tIns="133350" rIns="133350" bIns="133350" numCol="1" spcCol="1270" anchor="ctr" anchorCtr="0">
+          <a:noAutofit/>
+        </a:bodyPr>
+        <a:lstStyle/>
+        <a:p>
+          <a:pPr marL="0" lvl="0" indent="0" algn="l" defTabSz="1555750">
+            <a:lnSpc>
+              <a:spcPct val="90000"/>
+            </a:lnSpc>
+            <a:spcBef>
+              <a:spcPct val="0"/>
+            </a:spcBef>
+            <a:spcAft>
+              <a:spcPct val="35000"/>
+            </a:spcAft>
+            <a:buNone/>
+          </a:pPr>
+          <a:r>
+            <a:rPr lang="en-CH" sz="3500" kern="1200" dirty="0">
+              <a:latin typeface="Inter" panose="02000503000000020004" pitchFamily="50" charset="0"/>
+              <a:ea typeface="Inter" panose="02000503000000020004" pitchFamily="50" charset="0"/>
+              <a:cs typeface="Inter" panose="02000503000000020004" pitchFamily="50" charset="0"/>
+            </a:rPr>
+            <a:t>Generalized Model</a:t>
+          </a:r>
+        </a:p>
+      </dsp:txBody>
+      <dsp:txXfrm>
+        <a:off x="41979" y="1066791"/>
+        <a:ext cx="8339317" cy="775991"/>
+      </dsp:txXfrm>
+    </dsp:sp>
+    <dsp:sp modelId="{FE080762-F35C-412D-845B-319C4A14A12D}">
+      <dsp:nvSpPr>
+        <dsp:cNvPr id="0" name=""/>
+        <dsp:cNvSpPr/>
+      </dsp:nvSpPr>
+      <dsp:spPr>
+        <a:xfrm>
+          <a:off x="0" y="1985562"/>
+          <a:ext cx="8423275" cy="859949"/>
+        </a:xfrm>
+        <a:prstGeom prst="roundRect">
+          <a:avLst/>
+        </a:prstGeom>
+        <a:solidFill>
+          <a:schemeClr val="lt1">
+            <a:hueOff val="0"/>
+            <a:satOff val="0"/>
+            <a:lumOff val="0"/>
+            <a:alphaOff val="0"/>
+          </a:schemeClr>
+        </a:solidFill>
+        <a:ln w="19050" cap="flat" cmpd="sng" algn="ctr">
+          <a:solidFill>
+            <a:schemeClr val="accent5">
+              <a:shade val="80000"/>
+              <a:hueOff val="0"/>
+              <a:satOff val="0"/>
+              <a:lumOff val="0"/>
+              <a:alphaOff val="0"/>
+            </a:schemeClr>
+          </a:solidFill>
+          <a:prstDash val="solid"/>
+          <a:miter lim="800000"/>
+        </a:ln>
+        <a:effectLst/>
+      </dsp:spPr>
+      <dsp:style>
+        <a:lnRef idx="3">
+          <a:scrgbClr r="0" g="0" b="0"/>
+        </a:lnRef>
+        <a:fillRef idx="1">
+          <a:scrgbClr r="0" g="0" b="0"/>
+        </a:fillRef>
+        <a:effectRef idx="1">
+          <a:scrgbClr r="0" g="0" b="0"/>
+        </a:effectRef>
+        <a:fontRef idx="minor">
+          <a:schemeClr val="lt1"/>
+        </a:fontRef>
+      </dsp:style>
+      <dsp:txBody>
+        <a:bodyPr spcFirstLastPara="0" vert="horz" wrap="square" lIns="133350" tIns="133350" rIns="133350" bIns="133350" numCol="1" spcCol="1270" anchor="ctr" anchorCtr="0">
+          <a:noAutofit/>
+        </a:bodyPr>
+        <a:lstStyle/>
+        <a:p>
+          <a:pPr marL="0" lvl="0" indent="0" algn="l" defTabSz="1555750">
+            <a:lnSpc>
+              <a:spcPct val="90000"/>
+            </a:lnSpc>
+            <a:spcBef>
+              <a:spcPct val="0"/>
+            </a:spcBef>
+            <a:spcAft>
+              <a:spcPct val="35000"/>
+            </a:spcAft>
+            <a:buNone/>
+          </a:pPr>
+          <a:r>
+            <a:rPr lang="en-CH" sz="3500" kern="1200" dirty="0">
+              <a:latin typeface="Inter" panose="02000503000000020004" pitchFamily="50" charset="0"/>
+              <a:ea typeface="Inter" panose="02000503000000020004" pitchFamily="50" charset="0"/>
+              <a:cs typeface="Inter" panose="02000503000000020004" pitchFamily="50" charset="0"/>
+            </a:rPr>
+            <a:t>Statistical Characteristics</a:t>
+          </a:r>
+        </a:p>
+      </dsp:txBody>
+      <dsp:txXfrm>
+        <a:off x="41979" y="2027541"/>
+        <a:ext cx="8339317" cy="775991"/>
+      </dsp:txXfrm>
+    </dsp:sp>
+    <dsp:sp modelId="{9728DBE3-27A7-423C-A0FC-CB3192CF788F}">
+      <dsp:nvSpPr>
+        <dsp:cNvPr id="0" name=""/>
+        <dsp:cNvSpPr/>
+      </dsp:nvSpPr>
+      <dsp:spPr>
+        <a:xfrm>
+          <a:off x="0" y="2946312"/>
+          <a:ext cx="8423275" cy="859949"/>
+        </a:xfrm>
+        <a:prstGeom prst="roundRect">
+          <a:avLst/>
+        </a:prstGeom>
+        <a:solidFill>
+          <a:schemeClr val="lt1">
+            <a:hueOff val="0"/>
+            <a:satOff val="0"/>
+            <a:lumOff val="0"/>
+            <a:alphaOff val="0"/>
+          </a:schemeClr>
+        </a:solidFill>
+        <a:ln w="19050" cap="flat" cmpd="sng" algn="ctr">
+          <a:solidFill>
+            <a:schemeClr val="accent5">
+              <a:shade val="80000"/>
+              <a:hueOff val="0"/>
+              <a:satOff val="0"/>
+              <a:lumOff val="0"/>
+              <a:alphaOff val="0"/>
+            </a:schemeClr>
+          </a:solidFill>
+          <a:prstDash val="solid"/>
+          <a:miter lim="800000"/>
+        </a:ln>
+        <a:effectLst/>
+      </dsp:spPr>
+      <dsp:style>
+        <a:lnRef idx="3">
+          <a:scrgbClr r="0" g="0" b="0"/>
+        </a:lnRef>
+        <a:fillRef idx="1">
+          <a:scrgbClr r="0" g="0" b="0"/>
+        </a:fillRef>
+        <a:effectRef idx="1">
+          <a:scrgbClr r="0" g="0" b="0"/>
+        </a:effectRef>
+        <a:fontRef idx="minor">
+          <a:schemeClr val="lt1"/>
+        </a:fontRef>
+      </dsp:style>
+      <dsp:txBody>
+        <a:bodyPr spcFirstLastPara="0" vert="horz" wrap="square" lIns="133350" tIns="133350" rIns="133350" bIns="133350" numCol="1" spcCol="1270" anchor="ctr" anchorCtr="0">
+          <a:noAutofit/>
+        </a:bodyPr>
+        <a:lstStyle/>
+        <a:p>
+          <a:pPr marL="0" lvl="0" indent="0" algn="l" defTabSz="1555750">
+            <a:lnSpc>
+              <a:spcPct val="90000"/>
+            </a:lnSpc>
+            <a:spcBef>
+              <a:spcPct val="0"/>
+            </a:spcBef>
+            <a:spcAft>
+              <a:spcPct val="35000"/>
+            </a:spcAft>
+            <a:buNone/>
+          </a:pPr>
+          <a:r>
+            <a:rPr lang="en-CH" sz="3500" kern="1200" dirty="0">
+              <a:latin typeface="Inter" panose="02000503000000020004" pitchFamily="50" charset="0"/>
+              <a:ea typeface="Inter" panose="02000503000000020004" pitchFamily="50" charset="0"/>
+              <a:cs typeface="Inter" panose="02000503000000020004" pitchFamily="50" charset="0"/>
+            </a:rPr>
+            <a:t>Identification of Static Characteristics</a:t>
+          </a:r>
+        </a:p>
+      </dsp:txBody>
+      <dsp:txXfrm>
+        <a:off x="41979" y="2988291"/>
+        <a:ext cx="8339317" cy="775991"/>
+      </dsp:txXfrm>
+    </dsp:sp>
+  </dsp:spTree>
+</dsp:drawing>
+</file>
+
+<file path=ppt/diagrams/layout1.xml><?xml version="1.0" encoding="utf-8"?>
+<dgm:layoutDef xmlns:dgm="http://schemas.openxmlformats.org/drawingml/2006/diagram" xmlns:a="http://schemas.openxmlformats.org/drawingml/2006/main" uniqueId="urn:microsoft.com/office/officeart/2005/8/layout/vList2">
+  <dgm:title val=""/>
+  <dgm:desc val=""/>
+  <dgm:catLst>
+    <dgm:cat type="list" pri="3000"/>
+    <dgm:cat type="convert" pri="1000"/>
+  </dgm:catLst>
+  <dgm:sampData>
+    <dgm:dataModel>
+      <dgm:ptLst>
+        <dgm:pt modelId="0" type="doc"/>
+        <dgm:pt modelId="1">
+          <dgm:prSet phldr="1"/>
+        </dgm:pt>
+        <dgm:pt modelId="11">
+          <dgm:prSet phldr="1"/>
+        </dgm:pt>
+        <dgm:pt modelId="2">
+          <dgm:prSet phldr="1"/>
+        </dgm:pt>
+        <dgm:pt modelId="21">
+          <dgm:prSet phldr="1"/>
+        </dgm:pt>
+      </dgm:ptLst>
+      <dgm:cxnLst>
+        <dgm:cxn modelId="4" srcId="0" destId="1" srcOrd="0" destOrd="0"/>
+        <dgm:cxn modelId="5" srcId="0" destId="2" srcOrd="1" destOrd="0"/>
+        <dgm:cxn modelId="12" srcId="1" destId="11" srcOrd="0" destOrd="0"/>
+        <dgm:cxn modelId="23" srcId="2" destId="21" srcOrd="0" destOrd="0"/>
+      </dgm:cxnLst>
+      <dgm:bg/>
+      <dgm:whole/>
+    </dgm:dataModel>
+  </dgm:sampData>
+  <dgm:styleData>
+    <dgm:dataModel>
+      <dgm:ptLst>
+        <dgm:pt modelId="0" type="doc"/>
+        <dgm:pt modelId="1"/>
+        <dgm:pt modelId="2"/>
+      </dgm:ptLst>
+      <dgm:cxnLst>
+        <dgm:cxn modelId="3" srcId="0" destId="1" srcOrd="0" destOrd="0"/>
+        <dgm:cxn modelId="4" srcId="0" destId="2" srcOrd="1" destOrd="0"/>
+      </dgm:cxnLst>
+      <dgm:bg/>
+      <dgm:whole/>
+    </dgm:dataModel>
+  </dgm:styleData>
+  <dgm:clrData>
+    <dgm:dataModel>
+      <dgm:ptLst>
+        <dgm:pt modelId="0" type="doc"/>
+        <dgm:pt modelId="1"/>
+        <dgm:pt modelId="2"/>
+        <dgm:pt modelId="3"/>
+        <dgm:pt modelId="4"/>
+      </dgm:ptLst>
+      <dgm:cxnLst>
+        <dgm:cxn modelId="5" srcId="0" destId="1" srcOrd="0" destOrd="0"/>
+        <dgm:cxn modelId="6" srcId="0" destId="2" srcOrd="1" destOrd="0"/>
+        <dgm:cxn modelId="7" srcId="0" destId="3" srcOrd="2" destOrd="0"/>
+        <dgm:cxn modelId="8" srcId="0" destId="4" srcOrd="3" destOrd="0"/>
+      </dgm:cxnLst>
+      <dgm:bg/>
+      <dgm:whole/>
+    </dgm:dataModel>
+  </dgm:clrData>
+  <dgm:layoutNode name="linear">
+    <dgm:varLst>
+      <dgm:animLvl val="lvl"/>
+      <dgm:resizeHandles val="exact"/>
+    </dgm:varLst>
+    <dgm:alg type="lin">
+      <dgm:param type="linDir" val="fromT"/>
+      <dgm:param type="vertAlign" val="mid"/>
+    </dgm:alg>
+    <dgm:shape xmlns:r="http://schemas.openxmlformats.org/officeDocument/2006/relationships" r:blip="">
+      <dgm:adjLst/>
+    </dgm:shape>
+    <dgm:presOf/>
+    <dgm:constrLst>
+      <dgm:constr type="w" for="ch" forName="parentText" refType="w"/>
+      <dgm:constr type="h" for="ch" forName="parentText" refType="primFontSz" refFor="ch" refForName="parentText" fact="0.52"/>
+      <dgm:constr type="w" for="ch" forName="childText" refType="w"/>
+      <dgm:constr type="h" for="ch" forName="childText" refType="primFontSz" refFor="ch" refForName="parentText" fact="0.46"/>
+      <dgm:constr type="h" for="ch" forName="parentText" op="equ"/>
+      <dgm:constr type="primFontSz" for="ch" forName="parentText" op="equ" val="65"/>
+      <dgm:constr type="primFontSz" for="ch" forName="childText" refType="primFontSz" refFor="ch" refForName="parentText" op="equ"/>
+      <dgm:constr type="h" for="ch" forName="spacer" refType="primFontSz" refFor="ch" refForName="parentText" fact="0.08"/>
+    </dgm:constrLst>
+    <dgm:ruleLst>
+      <dgm:rule type="primFontSz" for="ch" forName="parentText" val="5" fact="NaN" max="NaN"/>
+    </dgm:ruleLst>
+    <dgm:forEach name="Name0" axis="ch" ptType="node">
+      <dgm:layoutNode name="parentText" styleLbl="node1">
+        <dgm:varLst>
+          <dgm:chMax val="0"/>
+          <dgm:bulletEnabled val="1"/>
+        </dgm:varLst>
+        <dgm:alg type="tx">
+          <dgm:param type="parTxLTRAlign" val="l"/>
+          <dgm:param type="parTxRTLAlign" val="r"/>
+        </dgm:alg>
+        <dgm:shape xmlns:r="http://schemas.openxmlformats.org/officeDocument/2006/relationships" type="roundRect" r:blip="">
+          <dgm:adjLst/>
+        </dgm:shape>
+        <dgm:presOf axis="self"/>
+        <dgm:constrLst>
+          <dgm:constr type="tMarg" refType="primFontSz" fact="0.3"/>
+          <dgm:constr type="bMarg" refType="primFontSz" fact="0.3"/>
+          <dgm:constr type="lMarg" refType="primFontSz" fact="0.3"/>
+          <dgm:constr type="rMarg" refType="primFontSz" fact="0.3"/>
+        </dgm:constrLst>
+        <dgm:ruleLst>
+          <dgm:rule type="h" val="INF" fact="NaN" max="NaN"/>
+        </dgm:ruleLst>
+      </dgm:layoutNode>
+      <dgm:choose name="Name1">
+        <dgm:if name="Name2" axis="ch" ptType="node" func="cnt" op="gte" val="1">
+          <dgm:layoutNode name="childText" styleLbl="revTx">
+            <dgm:varLst>
+              <dgm:bulletEnabled val="1"/>
+            </dgm:varLst>
+            <dgm:alg type="tx">
+              <dgm:param type="stBulletLvl" val="1"/>
+              <dgm:param type="lnSpAfChP" val="20"/>
+            </dgm:alg>
+            <dgm:shape xmlns:r="http://schemas.openxmlformats.org/officeDocument/2006/relationships" type="rect" r:blip="">
+              <dgm:adjLst/>
+            </dgm:shape>
+            <dgm:presOf axis="des" ptType="node"/>
+            <dgm:constrLst>
+              <dgm:constr type="tMarg" refType="primFontSz" fact="0.1"/>
+              <dgm:constr type="bMarg" refType="primFontSz" fact="0.1"/>
+              <dgm:constr type="lMarg" refType="w" fact="0.09"/>
+            </dgm:constrLst>
+            <dgm:ruleLst>
+              <dgm:rule type="h" val="INF" fact="NaN" max="NaN"/>
+            </dgm:ruleLst>
+          </dgm:layoutNode>
+        </dgm:if>
+        <dgm:else name="Name3">
+          <dgm:choose name="Name4">
+            <dgm:if name="Name5" axis="par ch" ptType="doc node" func="cnt" op="gte" val="2">
+              <dgm:forEach name="Name6" axis="followSib" ptType="sibTrans" cnt="1">
+                <dgm:layoutNode name="spacer">
+                  <dgm:alg type="sp"/>
+                  <dgm:shape xmlns:r="http://schemas.openxmlformats.org/officeDocument/2006/relationships" r:blip="">
+                    <dgm:adjLst/>
+                  </dgm:shape>
+                  <dgm:presOf/>
+                  <dgm:constrLst/>
+                  <dgm:ruleLst/>
+                </dgm:layoutNode>
+              </dgm:forEach>
+            </dgm:if>
+            <dgm:else name="Name7"/>
+          </dgm:choose>
+        </dgm:else>
+      </dgm:choose>
+    </dgm:forEach>
+  </dgm:layoutNode>
+</dgm:layoutDef>
+</file>
+
+<file path=ppt/diagrams/quickStyle1.xml><?xml version="1.0" encoding="utf-8"?>
+<dgm:styleDef xmlns:dgm="http://schemas.openxmlformats.org/drawingml/2006/diagram" xmlns:a="http://schemas.openxmlformats.org/drawingml/2006/main" uniqueId="urn:microsoft.com/office/officeart/2005/8/quickstyle/simple2">
+  <dgm:title val=""/>
+  <dgm:desc val=""/>
+  <dgm:catLst>
+    <dgm:cat type="simple" pri="10200"/>
+  </dgm:catLst>
+  <dgm:scene3d>
+    <a:camera prst="orthographicFront"/>
+    <a:lightRig rig="threePt" dir="t"/>
+  </dgm:scene3d>
+  <dgm:styleLbl name="node0">
+    <dgm:scene3d>
+      <a:camera prst="orthographicFront"/>
+      <a:lightRig rig="threePt" dir="t"/>
+    </dgm:scene3d>
+    <dgm:sp3d/>
+    <dgm:txPr/>
+    <dgm:style>
+      <a:lnRef idx="3">
+        <a:scrgbClr r="0" g="0" b="0"/>
+      </a:lnRef>
+      <a:fillRef idx="1">
+        <a:scrgbClr r="0" g="0" b="0"/>
+      </a:fillRef>
+      <a:effectRef idx="1">
+        <a:scrgbClr r="0" g="0" b="0"/>
+      </a:effectRef>
+      <a:fontRef idx="minor">
+        <a:schemeClr val="lt1"/>
+      </a:fontRef>
+    </dgm:style>
+  </dgm:styleLbl>
+  <dgm:styleLbl name="lnNode1">
+    <dgm:scene3d>
+      <a:camera prst="orthographicFront"/>
+      <a:lightRig rig="threePt" dir="t"/>
+    </dgm:scene3d>
+    <dgm:sp3d/>
+    <dgm:txPr/>
+    <dgm:style>
+      <a:lnRef idx="3">
+        <a:scrgbClr r="0" g="0" b="0"/>
+      </a:lnRef>
+      <a:fillRef idx="1">
+        <a:scrgbClr r="0" g="0" b="0"/>
+      </a:fillRef>
+      <a:effectRef idx="1">
+        <a:scrgbClr r="0" g="0" b="0"/>
+      </a:effectRef>
+      <a:fontRef idx="minor">
+        <a:schemeClr val="lt1"/>
+      </a:fontRef>
+    </dgm:style>
+  </dgm:styleLbl>
+  <dgm:styleLbl name="vennNode1">
+    <dgm:scene3d>
+      <a:camera prst="orthographicFront"/>
+      <a:lightRig rig="threePt" dir="t"/>
+    </dgm:scene3d>
+    <dgm:sp3d/>
+    <dgm:txPr/>
+    <dgm:style>
+      <a:lnRef idx="3">
+        <a:scrgbClr r="0" g="0" b="0"/>
+      </a:lnRef>
+      <a:fillRef idx="1">
+        <a:scrgbClr r="0" g="0" b="0"/>
+      </a:fillRef>
+      <a:effectRef idx="0">
+        <a:scrgbClr r="0" g="0" b="0"/>
+      </a:effectRef>
+      <a:fontRef idx="minor">
+        <a:schemeClr val="tx1"/>
+      </a:fontRef>
+    </dgm:style>
+  </dgm:styleLbl>
+  <dgm:styleLbl name="alignNode1">
+    <dgm:scene3d>
+      <a:camera prst="orthographicFront"/>
+      <a:lightRig rig="threePt" dir="t"/>
+    </dgm:scene3d>
+    <dgm:sp3d/>
+    <dgm:txPr/>
+    <dgm:style>
+      <a:lnRef idx="2">
+        <a:scrgbClr r="0" g="0" b="0"/>
+      </a:lnRef>
+      <a:fillRef idx="1">
+        <a:scrgbClr r="0" g="0" b="0"/>
+      </a:fillRef>
+      <a:effectRef idx="1">
+        <a:scrgbClr r="0" g="0" b="0"/>
+      </a:effectRef>
+      <a:fontRef idx="minor">
+        <a:schemeClr val="lt1"/>
+      </a:fontRef>
+    </dgm:style>
+  </dgm:styleLbl>
+  <dgm:styleLbl name="node1">
+    <dgm:scene3d>
+      <a:camera prst="orthographicFront"/>
+      <a:lightRig rig="threePt" dir="t"/>
+    </dgm:scene3d>
+    <dgm:sp3d/>
+    <dgm:txPr/>
+    <dgm:style>
+      <a:lnRef idx="3">
+        <a:scrgbClr r="0" g="0" b="0"/>
+      </a:lnRef>
+      <a:fillRef idx="1">
+        <a:scrgbClr r="0" g="0" b="0"/>
+      </a:fillRef>
+      <a:effectRef idx="1">
+        <a:scrgbClr r="0" g="0" b="0"/>
+      </a:effectRef>
+      <a:fontRef idx="minor">
+        <a:schemeClr val="lt1"/>
+      </a:fontRef>
+    </dgm:style>
+  </dgm:styleLbl>
+  <dgm:styleLbl name="node2">
+    <dgm:scene3d>
+      <a:camera prst="orthographicFront"/>
+      <a:lightRig rig="threePt" dir="t"/>
+    </dgm:scene3d>
+    <dgm:sp3d/>
+    <dgm:txPr/>
+    <dgm:style>
+      <a:lnRef idx="3">
+        <a:scrgbClr r="0" g="0" b="0"/>
+      </a:lnRef>
+      <a:fillRef idx="1">
+        <a:scrgbClr r="0" g="0" b="0"/>
+      </a:fillRef>
+      <a:effectRef idx="1">
+        <a:scrgbClr r="0" g="0" b="0"/>
+      </a:effectRef>
+      <a:fontRef idx="minor">
+        <a:schemeClr val="lt1"/>
+      </a:fontRef>
+    </dgm:style>
+  </dgm:styleLbl>
+  <dgm:styleLbl name="node3">
+    <dgm:scene3d>
+      <a:camera prst="orthographicFront"/>
+      <a:lightRig rig="threePt" dir="t"/>
+    </dgm:scene3d>
+    <dgm:sp3d/>
+    <dgm:txPr/>
+    <dgm:style>
+      <a:lnRef idx="3">
+        <a:scrgbClr r="0" g="0" b="0"/>
+      </a:lnRef>
+      <a:fillRef idx="1">
+        <a:scrgbClr r="0" g="0" b="0"/>
+      </a:fillRef>
+      <a:effectRef idx="1">
+        <a:scrgbClr r="0" g="0" b="0"/>
+      </a:effectRef>
+      <a:fontRef idx="minor">
+        <a:schemeClr val="lt1"/>
+      </a:fontRef>
+    </dgm:style>
+  </dgm:styleLbl>
+  <dgm:styleLbl name="node4">
+    <dgm:scene3d>
+      <a:camera prst="orthographicFront"/>
+      <a:lightRig rig="threePt" dir="t"/>
+    </dgm:scene3d>
+    <dgm:sp3d/>
+    <dgm:txPr/>
+    <dgm:style>
+      <a:lnRef idx="3">
+        <a:scrgbClr r="0" g="0" b="0"/>
+      </a:lnRef>
+      <a:fillRef idx="1">
+        <a:scrgbClr r="0" g="0" b="0"/>
+      </a:fillRef>
+      <a:effectRef idx="1">
+        <a:scrgbClr r="0" g="0" b="0"/>
+      </a:effectRef>
+      <a:fontRef idx="minor">
+        <a:schemeClr val="lt1"/>
+      </a:fontRef>
+    </dgm:style>
+  </dgm:styleLbl>
+  <dgm:styleLbl name="fgImgPlace1">
+    <dgm:scene3d>
+      <a:camera prst="orthographicFront"/>
+      <a:lightRig rig="threePt" dir="t"/>
+    </dgm:scene3d>
+    <dgm:sp3d/>
+    <dgm:txPr/>
+    <dgm:style>
+      <a:lnRef idx="3">
+        <a:scrgbClr r="0" g="0" b="0"/>
+      </a:lnRef>
+      <a:fillRef idx="1">
+        <a:scrgbClr r="0" g="0" b="0"/>
+      </a:fillRef>
+      <a:effectRef idx="1">
+        <a:scrgbClr r="0" g="0" b="0"/>
+      </a:effectRef>
+      <a:fontRef idx="minor"/>
+    </dgm:style>
+  </dgm:styleLbl>
+  <dgm:styleLbl name="alignImgPlace1">
+    <dgm:scene3d>
+      <a:camera prst="orthographicFront"/>
+      <a:lightRig rig="threePt" dir="t"/>
+    </dgm:scene3d>
+    <dgm:sp3d/>
+    <dgm:txPr/>
+    <dgm:style>
+      <a:lnRef idx="3">
+        <a:scrgbClr r="0" g="0" b="0"/>
+      </a:lnRef>
+      <a:fillRef idx="1">
+        <a:scrgbClr r="0" g="0" b="0"/>
+      </a:fillRef>
+      <a:effectRef idx="1">
+        <a:scrgbClr r="0" g="0" b="0"/>
+      </a:effectRef>
+      <a:fontRef idx="minor"/>
+    </dgm:style>
+  </dgm:styleLbl>
+  <dgm:styleLbl name="bgImgPlace1">
+    <dgm:scene3d>
+      <a:camera prst="orthographicFront"/>
+      <a:lightRig rig="threePt" dir="t"/>
+    </dgm:scene3d>
+    <dgm:sp3d/>
+    <dgm:txPr/>
+    <dgm:style>
+      <a:lnRef idx="3">
+        <a:scrgbClr r="0" g="0" b="0"/>
+      </a:lnRef>
+      <a:fillRef idx="1">
+        <a:scrgbClr r="0" g="0" b="0"/>
+      </a:fillRef>
+      <a:effectRef idx="1">
+        <a:scrgbClr r="0" g="0" b="0"/>
+      </a:effectRef>
+      <a:fontRef idx="minor"/>
+    </dgm:style>
+  </dgm:styleLbl>
+  <dgm:styleLbl name="sibTrans2D1">
+    <dgm:scene3d>
+      <a:camera prst="orthographicFront"/>
+      <a:lightRig rig="threePt" dir="t"/>
+    </dgm:scene3d>
+    <dgm:sp3d/>
+    <dgm:txPr/>
+    <dgm:style>
+      <a:lnRef idx="0">
+        <a:scrgbClr r="0" g="0" b="0"/>
+      </a:lnRef>
+      <a:fillRef idx="1">
+        <a:scrgbClr r="0" g="0" b="0"/>
+      </a:fillRef>
+      <a:effectRef idx="1">
+        <a:scrgbClr r="0" g="0" b="0"/>
+      </a:effectRef>
+      <a:fontRef idx="minor">
+        <a:schemeClr val="lt1"/>
+      </a:fontRef>
+    </dgm:style>
+  </dgm:styleLbl>
+  <dgm:styleLbl name="fgSibTrans2D1">
+    <dgm:scene3d>
+      <a:camera prst="orthographicFront"/>
+      <a:lightRig rig="threePt" dir="t"/>
+    </dgm:scene3d>
+    <dgm:sp3d/>
+    <dgm:txPr/>
+    <dgm:style>
+      <a:lnRef idx="0">
+        <a:scrgbClr r="0" g="0" b="0"/>
+      </a:lnRef>
+      <a:fillRef idx="1">
+        <a:scrgbClr r="0" g="0" b="0"/>
+      </a:fillRef>
+      <a:effectRef idx="1">
+        <a:scrgbClr r="0" g="0" b="0"/>
+      </a:effectRef>
+      <a:fontRef idx="minor">
+        <a:schemeClr val="lt1"/>
+      </a:fontRef>
+    </dgm:style>
+  </dgm:styleLbl>
+  <dgm:styleLbl name="bgSibTrans2D1">
+    <dgm:scene3d>
+      <a:camera prst="orthographicFront"/>
+      <a:lightRig rig="threePt" dir="t"/>
+    </dgm:scene3d>
+    <dgm:sp3d/>
+    <dgm:txPr/>
+    <dgm:style>
+      <a:lnRef idx="0">
+        <a:scrgbClr r="0" g="0" b="0"/>
+      </a:lnRef>
+      <a:fillRef idx="1">
+        <a:scrgbClr r="0" g="0" b="0"/>
+      </a:fillRef>
+      <a:effectRef idx="1">
+        <a:scrgbClr r="0" g="0" b="0"/>
+      </a:effectRef>
+      <a:fontRef idx="minor">
+        <a:schemeClr val="lt1"/>
+      </a:fontRef>
+    </dgm:style>
+  </dgm:styleLbl>
+  <dgm:styleLbl name="sibTrans1D1">
+    <dgm:scene3d>
+      <a:camera prst="orthographicFront"/>
+      <a:lightRig rig="threePt" dir="t"/>
+    </dgm:scene3d>
+    <dgm:sp3d/>
+    <dgm:txPr/>
+    <dgm:style>
+      <a:lnRef idx="1">
+        <a:scrgbClr r="0" g="0" b="0"/>
+      </a:lnRef>
+      <a:fillRef idx="0">
+        <a:scrgbClr r="0" g="0" b="0"/>
+      </a:fillRef>
+      <a:effectRef idx="0">
+        <a:scrgbClr r="0" g="0" b="0"/>
+      </a:effectRef>
+      <a:fontRef idx="minor"/>
+    </dgm:style>
+  </dgm:styleLbl>
+  <dgm:styleLbl name="callout">
+    <dgm:scene3d>
+      <a:camera prst="orthographicFront"/>
+      <a:lightRig rig="threePt" dir="t"/>
+    </dgm:scene3d>
+    <dgm:sp3d/>
+    <dgm:txPr/>
+    <dgm:style>
+      <a:lnRef idx="2">
+        <a:scrgbClr r="0" g="0" b="0"/>
+      </a:lnRef>
+      <a:fillRef idx="1">
+        <a:scrgbClr r="0" g="0" b="0"/>
+      </a:fillRef>
+      <a:effectRef idx="1">
+        <a:scrgbClr r="0" g="0" b="0"/>
+      </a:effectRef>
+      <a:fontRef idx="minor"/>
+    </dgm:style>
+  </dgm:styleLbl>
+  <dgm:styleLbl name="asst0">
+    <dgm:scene3d>
+      <a:camera prst="orthographicFront"/>
+      <a:lightRig rig="threePt" dir="t"/>
+    </dgm:scene3d>
+    <dgm:sp3d/>
+    <dgm:txPr/>
+    <dgm:style>
+      <a:lnRef idx="3">
+        <a:scrgbClr r="0" g="0" b="0"/>
+      </a:lnRef>
+      <a:fillRef idx="1">
+        <a:scrgbClr r="0" g="0" b="0"/>
+      </a:fillRef>
+      <a:effectRef idx="1">
+        <a:scrgbClr r="0" g="0" b="0"/>
+      </a:effectRef>
+      <a:fontRef idx="minor">
+        <a:schemeClr val="lt1"/>
+      </a:fontRef>
+    </dgm:style>
+  </dgm:styleLbl>
+  <dgm:styleLbl name="asst1">
+    <dgm:scene3d>
+      <a:camera prst="orthographicFront"/>
+      <a:lightRig rig="threePt" dir="t"/>
+    </dgm:scene3d>
+    <dgm:sp3d/>
+    <dgm:txPr/>
+    <dgm:style>
+      <a:lnRef idx="3">
+        <a:scrgbClr r="0" g="0" b="0"/>
+      </a:lnRef>
+      <a:fillRef idx="1">
+        <a:scrgbClr r="0" g="0" b="0"/>
+      </a:fillRef>
+      <a:effectRef idx="1">
+        <a:scrgbClr r="0" g="0" b="0"/>
+      </a:effectRef>
+      <a:fontRef idx="minor">
+        <a:schemeClr val="lt1"/>
+      </a:fontRef>
+    </dgm:style>
+  </dgm:styleLbl>
+  <dgm:styleLbl name="asst2">
+    <dgm:scene3d>
+      <a:camera prst="orthographicFront"/>
+      <a:lightRig rig="threePt" dir="t"/>
+    </dgm:scene3d>
+    <dgm:sp3d/>
+    <dgm:txPr/>
+    <dgm:style>
+      <a:lnRef idx="3">
+        <a:scrgbClr r="0" g="0" b="0"/>
+      </a:lnRef>
+      <a:fillRef idx="1">
+        <a:scrgbClr r="0" g="0" b="0"/>
+      </a:fillRef>
+      <a:effectRef idx="1">
+        <a:scrgbClr r="0" g="0" b="0"/>
+      </a:effectRef>
+      <a:fontRef idx="minor">
+        <a:schemeClr val="lt1"/>
+      </a:fontRef>
+    </dgm:style>
+  </dgm:styleLbl>
+  <dgm:styleLbl name="asst3">
+    <dgm:scene3d>
+      <a:camera prst="orthographicFront"/>
+      <a:lightRig rig="threePt" dir="t"/>
+    </dgm:scene3d>
+    <dgm:sp3d/>
+    <dgm:txPr/>
+    <dgm:style>
+      <a:lnRef idx="3">
+        <a:scrgbClr r="0" g="0" b="0"/>
+      </a:lnRef>
+      <a:fillRef idx="1">
+        <a:scrgbClr r="0" g="0" b="0"/>
+      </a:fillRef>
+      <a:effectRef idx="1">
+        <a:scrgbClr r="0" g="0" b="0"/>
+      </a:effectRef>
+      <a:fontRef idx="minor">
+        <a:schemeClr val="lt1"/>
+      </a:fontRef>
+    </dgm:style>
+  </dgm:styleLbl>
+  <dgm:styleLbl name="asst4">
+    <dgm:scene3d>
+      <a:camera prst="orthographicFront"/>
+      <a:lightRig rig="threePt" dir="t"/>
+    </dgm:scene3d>
+    <dgm:sp3d/>
+    <dgm:txPr/>
+    <dgm:style>
+      <a:lnRef idx="3">
+        <a:scrgbClr r="0" g="0" b="0"/>
+      </a:lnRef>
+      <a:fillRef idx="1">
+        <a:scrgbClr r="0" g="0" b="0"/>
+      </a:fillRef>
+      <a:effectRef idx="1">
+        <a:scrgbClr r="0" g="0" b="0"/>
+      </a:effectRef>
+      <a:fontRef idx="minor">
+        <a:schemeClr val="lt1"/>
+      </a:fontRef>
+    </dgm:style>
+  </dgm:styleLbl>
+  <dgm:styleLbl name="parChTrans2D1">
+    <dgm:scene3d>
+      <a:camera prst="orthographicFront"/>
+      <a:lightRig rig="threePt" dir="t"/>
+    </dgm:scene3d>
+    <dgm:sp3d/>
+    <dgm:txPr/>
+    <dgm:style>
+      <a:lnRef idx="3">
+        <a:scrgbClr r="0" g="0" b="0"/>
+      </a:lnRef>
+      <a:fillRef idx="1">
+        <a:scrgbClr r="0" g="0" b="0"/>
+      </a:fillRef>
+      <a:effectRef idx="1">
+        <a:scrgbClr r="0" g="0" b="0"/>
+      </a:effectRef>
+      <a:fontRef idx="minor">
+        <a:schemeClr val="lt1"/>
+      </a:fontRef>
+    </dgm:style>
+  </dgm:styleLbl>
+  <dgm:styleLbl name="parChTrans2D2">
+    <dgm:scene3d>
+      <a:camera prst="orthographicFront"/>
+      <a:lightRig rig="threePt" dir="t"/>
+    </dgm:scene3d>
+    <dgm:sp3d/>
+    <dgm:txPr/>
+    <dgm:style>
+      <a:lnRef idx="3">
+        <a:scrgbClr r="0" g="0" b="0"/>
+      </a:lnRef>
+      <a:fillRef idx="1">
+        <a:scrgbClr r="0" g="0" b="0"/>
+      </a:fillRef>
+      <a:effectRef idx="1">
+        <a:scrgbClr r="0" g="0" b="0"/>
+      </a:effectRef>
+      <a:fontRef idx="minor">
+        <a:schemeClr val="lt1"/>
+      </a:fontRef>
+    </dgm:style>
+  </dgm:styleLbl>
+  <dgm:styleLbl name="parChTrans2D3">
+    <dgm:scene3d>
+      <a:camera prst="orthographicFront"/>
+      <a:lightRig rig="threePt" dir="t"/>
+    </dgm:scene3d>
+    <dgm:sp3d/>
+    <dgm:txPr/>
+    <dgm:style>
+      <a:lnRef idx="3">
+        <a:scrgbClr r="0" g="0" b="0"/>
+      </a:lnRef>
+      <a:fillRef idx="1">
+        <a:scrgbClr r="0" g="0" b="0"/>
+      </a:fillRef>
+      <a:effectRef idx="1">
+        <a:scrgbClr r="0" g="0" b="0"/>
+      </a:effectRef>
+      <a:fontRef idx="minor">
+        <a:schemeClr val="lt1"/>
+      </a:fontRef>
+    </dgm:style>
+  </dgm:styleLbl>
+  <dgm:styleLbl name="parChTrans2D4">
+    <dgm:scene3d>
+      <a:camera prst="orthographicFront"/>
+      <a:lightRig rig="threePt" dir="t"/>
+    </dgm:scene3d>
+    <dgm:sp3d/>
+    <dgm:txPr/>
+    <dgm:style>
+      <a:lnRef idx="3">
+        <a:scrgbClr r="0" g="0" b="0"/>
+      </a:lnRef>
+      <a:fillRef idx="1">
+        <a:scrgbClr r="0" g="0" b="0"/>
+      </a:fillRef>
+      <a:effectRef idx="1">
+        <a:scrgbClr r="0" g="0" b="0"/>
+      </a:effectRef>
+      <a:fontRef idx="minor">
+        <a:schemeClr val="lt1"/>
+      </a:fontRef>
+    </dgm:style>
+  </dgm:styleLbl>
+  <dgm:styleLbl name="parChTrans1D1">
+    <dgm:scene3d>
+      <a:camera prst="orthographicFront"/>
+      <a:lightRig rig="threePt" dir="t"/>
+    </dgm:scene3d>
+    <dgm:sp3d/>
+    <dgm:txPr/>
+    <dgm:style>
+      <a:lnRef idx="2">
+        <a:scrgbClr r="0" g="0" b="0"/>
+      </a:lnRef>
+      <a:fillRef idx="0">
+        <a:scrgbClr r="0" g="0" b="0"/>
+      </a:fillRef>
+      <a:effectRef idx="0">
+        <a:scrgbClr r="0" g="0" b="0"/>
+      </a:effectRef>
+      <a:fontRef idx="minor"/>
+    </dgm:style>
+  </dgm:styleLbl>
+  <dgm:styleLbl name="parChTrans1D2">
+    <dgm:scene3d>
+      <a:camera prst="orthographicFront"/>
+      <a:lightRig rig="threePt" dir="t"/>
+    </dgm:scene3d>
+    <dgm:sp3d/>
+    <dgm:txPr/>
+    <dgm:style>
+      <a:lnRef idx="2">
+        <a:scrgbClr r="0" g="0" b="0"/>
+      </a:lnRef>
+      <a:fillRef idx="0">
+        <a:scrgbClr r="0" g="0" b="0"/>
+      </a:fillRef>
+      <a:effectRef idx="0">
+        <a:scrgbClr r="0" g="0" b="0"/>
+      </a:effectRef>
+      <a:fontRef idx="minor"/>
+    </dgm:style>
+  </dgm:styleLbl>
+  <dgm:styleLbl name="parChTrans1D3">
+    <dgm:scene3d>
+      <a:camera prst="orthographicFront"/>
+      <a:lightRig rig="threePt" dir="t"/>
+    </dgm:scene3d>
+    <dgm:sp3d/>
+    <dgm:txPr/>
+    <dgm:style>
+      <a:lnRef idx="2">
+        <a:scrgbClr r="0" g="0" b="0"/>
+      </a:lnRef>
+      <a:fillRef idx="0">
+        <a:scrgbClr r="0" g="0" b="0"/>
+      </a:fillRef>
+      <a:effectRef idx="0">
+        <a:scrgbClr r="0" g="0" b="0"/>
+      </a:effectRef>
+      <a:fontRef idx="minor"/>
+    </dgm:style>
+  </dgm:styleLbl>
+  <dgm:styleLbl name="parChTrans1D4">
+    <dgm:scene3d>
+      <a:camera prst="orthographicFront"/>
+      <a:lightRig rig="threePt" dir="t"/>
+    </dgm:scene3d>
+    <dgm:sp3d/>
+    <dgm:txPr/>
+    <dgm:style>
+      <a:lnRef idx="2">
+        <a:scrgbClr r="0" g="0" b="0"/>
+      </a:lnRef>
+      <a:fillRef idx="0">
+        <a:scrgbClr r="0" g="0" b="0"/>
+      </a:fillRef>
+      <a:effectRef idx="0">
+        <a:scrgbClr r="0" g="0" b="0"/>
+      </a:effectRef>
+      <a:fontRef idx="minor"/>
+    </dgm:style>
+  </dgm:styleLbl>
+  <dgm:styleLbl name="fgAcc1">
+    <dgm:scene3d>
+      <a:camera prst="orthographicFront"/>
+      <a:lightRig rig="threePt" dir="t"/>
+    </dgm:scene3d>
+    <dgm:sp3d/>
+    <dgm:txPr/>
+    <dgm:style>
+      <a:lnRef idx="2">
+        <a:scrgbClr r="0" g="0" b="0"/>
+      </a:lnRef>
+      <a:fillRef idx="1">
+        <a:scrgbClr r="0" g="0" b="0"/>
+      </a:fillRef>
+      <a:effectRef idx="0">
+        <a:scrgbClr r="0" g="0" b="0"/>
+      </a:effectRef>
+      <a:fontRef idx="minor"/>
+    </dgm:style>
+  </dgm:styleLbl>
+  <dgm:styleLbl name="conFgAcc1">
+    <dgm:scene3d>
+      <a:camera prst="orthographicFront"/>
+      <a:lightRig rig="threePt" dir="t"/>
+    </dgm:scene3d>
+    <dgm:sp3d/>
+    <dgm:txPr/>
+    <dgm:style>
+      <a:lnRef idx="2">
+        <a:scrgbClr r="0" g="0" b="0"/>
+      </a:lnRef>
+      <a:fillRef idx="1">
+        <a:scrgbClr r="0" g="0" b="0"/>
+      </a:fillRef>
+      <a:effectRef idx="0">
+        <a:scrgbClr r="0" g="0" b="0"/>
+      </a:effectRef>
+      <a:fontRef idx="minor"/>
+    </dgm:style>
+  </dgm:styleLbl>
+  <dgm:styleLbl name="alignAcc1">
+    <dgm:scene3d>
+      <a:camera prst="orthographicFront"/>
+      <a:lightRig rig="threePt" dir="t"/>
+    </dgm:scene3d>
+    <dgm:sp3d/>
+    <dgm:txPr/>
+    <dgm:style>
+      <a:lnRef idx="2">
+        <a:scrgbClr r="0" g="0" b="0"/>
+      </a:lnRef>
+      <a:fillRef idx="1">
+        <a:scrgbClr r="0" g="0" b="0"/>
+      </a:fillRef>
+      <a:effectRef idx="0">
+        <a:scrgbClr r="0" g="0" b="0"/>
+      </a:effectRef>
+      <a:fontRef idx="minor"/>
+    </dgm:style>
+  </dgm:styleLbl>
+  <dgm:styleLbl name="trAlignAcc1">
+    <dgm:scene3d>
+      <a:camera prst="orthographicFront"/>
+      <a:lightRig rig="threePt" dir="t"/>
+    </dgm:scene3d>
+    <dgm:sp3d/>
+    <dgm:txPr/>
+    <dgm:style>
+      <a:lnRef idx="1">
+        <a:scrgbClr r="0" g="0" b="0"/>
+      </a:lnRef>
+      <a:fillRef idx="1">
+        <a:scrgbClr r="0" g="0" b="0"/>
+      </a:fillRef>
+      <a:effectRef idx="0">
+        <a:scrgbClr r="0" g="0" b="0"/>
+      </a:effectRef>
+      <a:fontRef idx="minor"/>
+    </dgm:style>
+  </dgm:styleLbl>
+  <dgm:styleLbl name="bgAcc1">
+    <dgm:scene3d>
+      <a:camera prst="orthographicFront"/>
+      <a:lightRig rig="threePt" dir="t"/>
+    </dgm:scene3d>
+    <dgm:sp3d/>
+    <dgm:txPr/>
+    <dgm:style>
+      <a:lnRef idx="2">
+        <a:scrgbClr r="0" g="0" b="0"/>
+      </a:lnRef>
+      <a:fillRef idx="1">
+        <a:scrgbClr r="0" g="0" b="0"/>
+      </a:fillRef>
+      <a:effectRef idx="0">
+        <a:scrgbClr r="0" g="0" b="0"/>
+      </a:effectRef>
+      <a:fontRef idx="minor"/>
+    </dgm:style>
+  </dgm:styleLbl>
+  <dgm:styleLbl name="solidFgAcc1">
+    <dgm:scene3d>
+      <a:camera prst="orthographicFront"/>
+      <a:lightRig rig="threePt" dir="t"/>
+    </dgm:scene3d>
+    <dgm:sp3d/>
+    <dgm:txPr/>
+    <dgm:style>
+      <a:lnRef idx="2">
+        <a:scrgbClr r="0" g="0" b="0"/>
+      </a:lnRef>
+      <a:fillRef idx="1">
+        <a:scrgbClr r="0" g="0" b="0"/>
+      </a:fillRef>
+      <a:effectRef idx="0">
+        <a:scrgbClr r="0" g="0" b="0"/>
+      </a:effectRef>
+      <a:fontRef idx="minor"/>
+    </dgm:style>
+  </dgm:styleLbl>
+  <dgm:styleLbl name="solidAlignAcc1">
+    <dgm:scene3d>
+      <a:camera prst="orthographicFront"/>
+      <a:lightRig rig="threePt" dir="t"/>
+    </dgm:scene3d>
+    <dgm:sp3d/>
+    <dgm:txPr/>
+    <dgm:style>
+      <a:lnRef idx="2">
+        <a:scrgbClr r="0" g="0" b="0"/>
+      </a:lnRef>
+      <a:fillRef idx="1">
+        <a:scrgbClr r="0" g="0" b="0"/>
+      </a:fillRef>
+      <a:effectRef idx="0">
+        <a:scrgbClr r="0" g="0" b="0"/>
+      </a:effectRef>
+      <a:fontRef idx="minor"/>
+    </dgm:style>
+  </dgm:styleLbl>
+  <dgm:styleLbl name="solidBgAcc1">
+    <dgm:scene3d>
+      <a:camera prst="orthographicFront"/>
+      <a:lightRig rig="threePt" dir="t"/>
+    </dgm:scene3d>
+    <dgm:sp3d/>
+    <dgm:txPr/>
+    <dgm:style>
+      <a:lnRef idx="2">
+        <a:scrgbClr r="0" g="0" b="0"/>
+      </a:lnRef>
+      <a:fillRef idx="1">
+        <a:scrgbClr r="0" g="0" b="0"/>
+      </a:fillRef>
+      <a:effectRef idx="0">
+        <a:scrgbClr r="0" g="0" b="0"/>
+      </a:effectRef>
+      <a:fontRef idx="minor"/>
+    </dgm:style>
+  </dgm:styleLbl>
+  <dgm:styleLbl name="fgAccFollowNode1">
+    <dgm:scene3d>
+      <a:camera prst="orthographicFront"/>
+      <a:lightRig rig="threePt" dir="t"/>
+    </dgm:scene3d>
+    <dgm:sp3d/>
+    <dgm:txPr/>
+    <dgm:style>
+      <a:lnRef idx="2">
+        <a:scrgbClr r="0" g="0" b="0"/>
+      </a:lnRef>
+      <a:fillRef idx="1">
+        <a:scrgbClr r="0" g="0" b="0"/>
+      </a:fillRef>
+      <a:effectRef idx="0">
+        <a:scrgbClr r="0" g="0" b="0"/>
+      </a:effectRef>
+      <a:fontRef idx="minor"/>
+    </dgm:style>
+  </dgm:styleLbl>
+  <dgm:styleLbl name="alignAccFollowNode1">
+    <dgm:scene3d>
+      <a:camera prst="orthographicFront"/>
+      <a:lightRig rig="threePt" dir="t"/>
+    </dgm:scene3d>
+    <dgm:sp3d/>
+    <dgm:txPr/>
+    <dgm:style>
+      <a:lnRef idx="2">
+        <a:scrgbClr r="0" g="0" b="0"/>
+      </a:lnRef>
+      <a:fillRef idx="1">
+        <a:scrgbClr r="0" g="0" b="0"/>
+      </a:fillRef>
+      <a:effectRef idx="0">
+        <a:scrgbClr r="0" g="0" b="0"/>
+      </a:effectRef>
+      <a:fontRef idx="minor"/>
+    </dgm:style>
+  </dgm:styleLbl>
+  <dgm:styleLbl name="bgAccFollowNode1">
+    <dgm:scene3d>
+      <a:camera prst="orthographicFront"/>
+      <a:lightRig rig="threePt" dir="t"/>
+    </dgm:scene3d>
+    <dgm:sp3d/>
+    <dgm:txPr/>
+    <dgm:style>
+      <a:lnRef idx="2">
+        <a:scrgbClr r="0" g="0" b="0"/>
+      </a:lnRef>
+      <a:fillRef idx="1">
+        <a:scrgbClr r="0" g="0" b="0"/>
+      </a:fillRef>
+      <a:effectRef idx="0">
+        <a:scrgbClr r="0" g="0" b="0"/>
+      </a:effectRef>
+      <a:fontRef idx="minor"/>
+    </dgm:style>
+  </dgm:styleLbl>
+  <dgm:styleLbl name="fgAcc0">
+    <dgm:scene3d>
+      <a:camera prst="orthographicFront"/>
+      <a:lightRig rig="threePt" dir="t"/>
+    </dgm:scene3d>
+    <dgm:sp3d/>
+    <dgm:txPr/>
+    <dgm:style>
+      <a:lnRef idx="2">
+        <a:scrgbClr r="0" g="0" b="0"/>
+      </a:lnRef>
+      <a:fillRef idx="1">
+        <a:scrgbClr r="0" g="0" b="0"/>
+      </a:fillRef>
+      <a:effectRef idx="0">
+        <a:scrgbClr r="0" g="0" b="0"/>
+      </a:effectRef>
+      <a:fontRef idx="minor"/>
+    </dgm:style>
+  </dgm:styleLbl>
+  <dgm:styleLbl name="fgAcc2">
+    <dgm:scene3d>
+      <a:camera prst="orthographicFront"/>
+      <a:lightRig rig="threePt" dir="t"/>
+    </dgm:scene3d>
+    <dgm:sp3d/>
+    <dgm:txPr/>
+    <dgm:style>
+      <a:lnRef idx="2">
+        <a:scrgbClr r="0" g="0" b="0"/>
+      </a:lnRef>
+      <a:fillRef idx="1">
+        <a:scrgbClr r="0" g="0" b="0"/>
+      </a:fillRef>
+      <a:effectRef idx="0">
+        <a:scrgbClr r="0" g="0" b="0"/>
+      </a:effectRef>
+      <a:fontRef idx="minor"/>
+    </dgm:style>
+  </dgm:styleLbl>
+  <dgm:styleLbl name="fgAcc3">
+    <dgm:scene3d>
+      <a:camera prst="orthographicFront"/>
+      <a:lightRig rig="threePt" dir="t"/>
+    </dgm:scene3d>
+    <dgm:sp3d/>
+    <dgm:txPr/>
+    <dgm:style>
+      <a:lnRef idx="2">
+        <a:scrgbClr r="0" g="0" b="0"/>
+      </a:lnRef>
+      <a:fillRef idx="1">
+        <a:scrgbClr r="0" g="0" b="0"/>
+      </a:fillRef>
+      <a:effectRef idx="0">
+        <a:scrgbClr r="0" g="0" b="0"/>
+      </a:effectRef>
+      <a:fontRef idx="minor"/>
+    </dgm:style>
+  </dgm:styleLbl>
+  <dgm:styleLbl name="fgAcc4">
+    <dgm:scene3d>
+      <a:camera prst="orthographicFront"/>
+      <a:lightRig rig="threePt" dir="t"/>
+    </dgm:scene3d>
+    <dgm:sp3d/>
+    <dgm:txPr/>
+    <dgm:style>
+      <a:lnRef idx="2">
+        <a:scrgbClr r="0" g="0" b="0"/>
+      </a:lnRef>
+      <a:fillRef idx="1">
+        <a:scrgbClr r="0" g="0" b="0"/>
+      </a:fillRef>
+      <a:effectRef idx="0">
+        <a:scrgbClr r="0" g="0" b="0"/>
+      </a:effectRef>
+      <a:fontRef idx="minor"/>
+    </dgm:style>
+  </dgm:styleLbl>
+  <dgm:styleLbl name="bgShp">
+    <dgm:scene3d>
+      <a:camera prst="orthographicFront"/>
+      <a:lightRig rig="threePt" dir="t"/>
+    </dgm:scene3d>
+    <dgm:sp3d/>
+    <dgm:txPr/>
+    <dgm:style>
+      <a:lnRef idx="0">
+        <a:scrgbClr r="0" g="0" b="0"/>
+      </a:lnRef>
+      <a:fillRef idx="1">
+        <a:scrgbClr r="0" g="0" b="0"/>
+      </a:fillRef>
+      <a:effectRef idx="0">
+        <a:scrgbClr r="0" g="0" b="0"/>
+      </a:effectRef>
+      <a:fontRef idx="minor"/>
+    </dgm:style>
+  </dgm:styleLbl>
+  <dgm:styleLbl name="dkBgShp">
+    <dgm:scene3d>
+      <a:camera prst="orthographicFront"/>
+      <a:lightRig rig="threePt" dir="t"/>
+    </dgm:scene3d>
+    <dgm:sp3d/>
+    <dgm:txPr/>
+    <dgm:style>
+      <a:lnRef idx="0">
+        <a:scrgbClr r="0" g="0" b="0"/>
+      </a:lnRef>
+      <a:fillRef idx="1">
+        <a:scrgbClr r="0" g="0" b="0"/>
+      </a:fillRef>
+      <a:effectRef idx="0">
+        <a:scrgbClr r="0" g="0" b="0"/>
+      </a:effectRef>
+      <a:fontRef idx="minor"/>
+    </dgm:style>
+  </dgm:styleLbl>
+  <dgm:styleLbl name="trBgShp">
+    <dgm:scene3d>
+      <a:camera prst="orthographicFront"/>
+      <a:lightRig rig="threePt" dir="t"/>
+    </dgm:scene3d>
+    <dgm:sp3d/>
+    <dgm:txPr/>
+    <dgm:style>
+      <a:lnRef idx="0">
+        <a:scrgbClr r="0" g="0" b="0"/>
+      </a:lnRef>
+      <a:fillRef idx="1">
+        <a:scrgbClr r="0" g="0" b="0"/>
+      </a:fillRef>
+      <a:effectRef idx="0">
+        <a:scrgbClr r="0" g="0" b="0"/>
+      </a:effectRef>
+      <a:fontRef idx="minor"/>
+    </dgm:style>
+  </dgm:styleLbl>
+  <dgm:styleLbl name="fgShp">
+    <dgm:scene3d>
+      <a:camera prst="orthographicFront"/>
+      <a:lightRig rig="threePt" dir="t"/>
+    </dgm:scene3d>
+    <dgm:sp3d/>
+    <dgm:txPr/>
+    <dgm:style>
+      <a:lnRef idx="3">
+        <a:scrgbClr r="0" g="0" b="0"/>
+      </a:lnRef>
+      <a:fillRef idx="1">
+        <a:scrgbClr r="0" g="0" b="0"/>
+      </a:fillRef>
+      <a:effectRef idx="1">
+        <a:scrgbClr r="0" g="0" b="0"/>
+      </a:effectRef>
+      <a:fontRef idx="minor"/>
+    </dgm:style>
+  </dgm:styleLbl>
+  <dgm:styleLbl name="revTx">
+    <dgm:scene3d>
+      <a:camera prst="orthographicFront"/>
+      <a:lightRig rig="threePt" dir="t"/>
+    </dgm:scene3d>
+    <dgm:sp3d/>
+    <dgm:txPr/>
+    <dgm:style>
+      <a:lnRef idx="0">
+        <a:scrgbClr r="0" g="0" b="0"/>
+      </a:lnRef>
+      <a:fillRef idx="0">
+        <a:scrgbClr r="0" g="0" b="0"/>
+      </a:fillRef>
+      <a:effectRef idx="0">
+        <a:scrgbClr r="0" g="0" b="0"/>
+      </a:effectRef>
+      <a:fontRef idx="minor"/>
+    </dgm:style>
+  </dgm:styleLbl>
+</dgm:styleDef>
 </file>
 
 <file path=ppt/notesMasters/notesMaster1.xml><?xml version="1.0" encoding="utf-8"?>
@@ -267,7 +2881,7 @@
           <a:p>
             <a:fld id="{46697828-BD99-4EE4-B248-B6544F3D4165}" type="datetimeFigureOut">
               <a:rPr lang="en-CH" smtClean="0"/>
-              <a:t>14/12/2023</a:t>
+              <a:t>04/01/2024</a:t>
             </a:fld>
             <a:endParaRPr lang="en-CH"/>
           </a:p>
@@ -898,6 +3512,22 @@
                   </a:rPr>
                   <a:t> environment)</a:t>
                 </a:r>
+              </a:p>
+              <a:p>
+                <a:pPr marL="171450" indent="-171450">
+                  <a:buFont typeface="Arial" panose="020B0604020202020204" pitchFamily="34" charset="0"/>
+                  <a:buChar char="•"/>
+                </a:pPr>
+                <a:r>
+                  <a:rPr lang="en-CH" sz="1100" dirty="0"/>
+                  <a:t>If not possible, measure all environmental inputs</a:t>
+                </a:r>
+              </a:p>
+              <a:p>
+                <a:pPr marL="0" indent="0">
+                  <a:buNone/>
+                </a:pPr>
+                <a:endParaRPr lang="en-CH" sz="1100" dirty="0"/>
               </a:p>
               <a:p>
                 <a:pPr marL="0" indent="0">
@@ -3299,7 +5929,11 @@
                 </a:r>
                 <a:r>
                   <a:rPr lang="en-CH" sz="1200" baseline="0" dirty="0"/>
-                  <a:t> deviation</a:t>
+                  <a:t> deviation. Improvements mean </a:t>
+                </a:r>
+                <a:r>
+                  <a:rPr lang="en-CH" sz="1200" baseline="0"/>
+                  <a:t>better repeatability</a:t>
                 </a:r>
                 <a:endParaRPr lang="en-CH" sz="1200" dirty="0"/>
               </a:p>
@@ -6003,7 +8637,7 @@
             <a:fld id="{5EC0B375-6A40-43D7-83C5-47D26144B495}" type="datetimeFigureOut">
               <a:rPr lang="en-CH" smtClean="0"/>
               <a:pPr/>
-              <a:t>14/12/2023</a:t>
+              <a:t>04/01/2024</a:t>
             </a:fld>
             <a:endParaRPr lang="en-CH"/>
           </a:p>
@@ -6210,7 +8844,7 @@
             <a:fld id="{5EC0B375-6A40-43D7-83C5-47D26144B495}" type="datetimeFigureOut">
               <a:rPr lang="en-CH" smtClean="0"/>
               <a:pPr/>
-              <a:t>14/12/2023</a:t>
+              <a:t>04/01/2024</a:t>
             </a:fld>
             <a:endParaRPr lang="en-CH"/>
           </a:p>
@@ -6417,7 +9051,7 @@
             <a:fld id="{5EC0B375-6A40-43D7-83C5-47D26144B495}" type="datetimeFigureOut">
               <a:rPr lang="en-CH" smtClean="0"/>
               <a:pPr/>
-              <a:t>14/12/2023</a:t>
+              <a:t>04/01/2024</a:t>
             </a:fld>
             <a:endParaRPr lang="en-CH"/>
           </a:p>
@@ -6708,7 +9342,7 @@
             <a:fld id="{5EC0B375-6A40-43D7-83C5-47D26144B495}" type="datetimeFigureOut">
               <a:rPr lang="en-CH" smtClean="0"/>
               <a:pPr/>
-              <a:t>14/12/2023</a:t>
+              <a:t>04/01/2024</a:t>
             </a:fld>
             <a:endParaRPr lang="en-CH"/>
           </a:p>
@@ -6978,7 +9612,7 @@
             <a:fld id="{5EC0B375-6A40-43D7-83C5-47D26144B495}" type="datetimeFigureOut">
               <a:rPr lang="en-CH" smtClean="0"/>
               <a:pPr/>
-              <a:t>14/12/2023</a:t>
+              <a:t>04/01/2024</a:t>
             </a:fld>
             <a:endParaRPr lang="en-CH"/>
           </a:p>
@@ -7122,7 +9756,7 @@
             <a:fld id="{5EC0B375-6A40-43D7-83C5-47D26144B495}" type="datetimeFigureOut">
               <a:rPr lang="en-CH" smtClean="0"/>
               <a:pPr/>
-              <a:t>14/12/2023</a:t>
+              <a:t>04/01/2024</a:t>
             </a:fld>
             <a:endParaRPr lang="en-CH"/>
           </a:p>
@@ -7329,7 +9963,7 @@
             <a:fld id="{5EC0B375-6A40-43D7-83C5-47D26144B495}" type="datetimeFigureOut">
               <a:rPr lang="en-CH" smtClean="0"/>
               <a:pPr/>
-              <a:t>14/12/2023</a:t>
+              <a:t>04/01/2024</a:t>
             </a:fld>
             <a:endParaRPr lang="en-CH"/>
           </a:p>
@@ -7536,7 +10170,7 @@
             <a:fld id="{5EC0B375-6A40-43D7-83C5-47D26144B495}" type="datetimeFigureOut">
               <a:rPr lang="en-CH" smtClean="0"/>
               <a:pPr/>
-              <a:t>14/12/2023</a:t>
+              <a:t>04/01/2024</a:t>
             </a:fld>
             <a:endParaRPr lang="en-CH"/>
           </a:p>
@@ -7827,7 +10461,7 @@
             <a:fld id="{5EC0B375-6A40-43D7-83C5-47D26144B495}" type="datetimeFigureOut">
               <a:rPr lang="en-CH" smtClean="0"/>
               <a:pPr/>
-              <a:t>14/12/2023</a:t>
+              <a:t>04/01/2024</a:t>
             </a:fld>
             <a:endParaRPr lang="en-CH"/>
           </a:p>
@@ -8097,7 +10731,7 @@
             <a:fld id="{5EC0B375-6A40-43D7-83C5-47D26144B495}" type="datetimeFigureOut">
               <a:rPr lang="en-CH" smtClean="0"/>
               <a:pPr/>
-              <a:t>14/12/2023</a:t>
+              <a:t>04/01/2024</a:t>
             </a:fld>
             <a:endParaRPr lang="en-CH"/>
           </a:p>
@@ -8241,7 +10875,7 @@
             <a:fld id="{5EC0B375-6A40-43D7-83C5-47D26144B495}" type="datetimeFigureOut">
               <a:rPr lang="en-CH" smtClean="0"/>
               <a:pPr/>
-              <a:t>14/12/2023</a:t>
+              <a:t>04/01/2024</a:t>
             </a:fld>
             <a:endParaRPr lang="en-CH"/>
           </a:p>
@@ -8532,7 +11166,7 @@
             <a:fld id="{5EC0B375-6A40-43D7-83C5-47D26144B495}" type="datetimeFigureOut">
               <a:rPr lang="en-CH" smtClean="0"/>
               <a:pPr/>
-              <a:t>14/12/2023</a:t>
+              <a:t>04/01/2024</a:t>
             </a:fld>
             <a:endParaRPr lang="en-CH"/>
           </a:p>
@@ -8814,7 +11448,7 @@
             <a:fld id="{5EC0B375-6A40-43D7-83C5-47D26144B495}" type="datetimeFigureOut">
               <a:rPr lang="en-CH" smtClean="0"/>
               <a:pPr/>
-              <a:t>14/12/2023</a:t>
+              <a:t>04/01/2024</a:t>
             </a:fld>
             <a:endParaRPr lang="en-CH"/>
           </a:p>
@@ -9184,7 +11818,7 @@
             <a:fld id="{5EC0B375-6A40-43D7-83C5-47D26144B495}" type="datetimeFigureOut">
               <a:rPr lang="en-CH" smtClean="0"/>
               <a:pPr/>
-              <a:t>14/12/2023</a:t>
+              <a:t>04/01/2024</a:t>
             </a:fld>
             <a:endParaRPr lang="en-CH"/>
           </a:p>
@@ -9770,7 +12404,7 @@
             <a:fld id="{5EC0B375-6A40-43D7-83C5-47D26144B495}" type="datetimeFigureOut">
               <a:rPr lang="en-CH" smtClean="0"/>
               <a:pPr/>
-              <a:t>14/12/2023</a:t>
+              <a:t>04/01/2024</a:t>
             </a:fld>
             <a:endParaRPr lang="en-CH"/>
           </a:p>
@@ -10061,7 +12695,7 @@
             <a:fld id="{5EC0B375-6A40-43D7-83C5-47D26144B495}" type="datetimeFigureOut">
               <a:rPr lang="en-CH" smtClean="0"/>
               <a:pPr/>
-              <a:t>14/12/2023</a:t>
+              <a:t>04/01/2024</a:t>
             </a:fld>
             <a:endParaRPr lang="en-CH"/>
           </a:p>
@@ -10683,7 +13317,7 @@
             <a:fld id="{5EC0B375-6A40-43D7-83C5-47D26144B495}" type="datetimeFigureOut">
               <a:rPr lang="en-CH" smtClean="0"/>
               <a:pPr/>
-              <a:t>14/12/2023</a:t>
+              <a:t>04/01/2024</a:t>
             </a:fld>
             <a:endParaRPr lang="en-CH"/>
           </a:p>
@@ -11263,7 +13897,7 @@
             <a:fld id="{5EC0B375-6A40-43D7-83C5-47D26144B495}" type="datetimeFigureOut">
               <a:rPr lang="en-CH" smtClean="0"/>
               <a:pPr/>
-              <a:t>14/12/2023</a:t>
+              <a:t>04/01/2024</a:t>
             </a:fld>
             <a:endParaRPr lang="en-CH"/>
           </a:p>
@@ -11798,7 +14432,7 @@
         <p:spPr/>
         <p:txBody>
           <a:bodyPr>
-            <a:normAutofit/>
+            <a:normAutofit fontScale="90000"/>
           </a:bodyPr>
           <a:lstStyle/>
           <a:p>
@@ -11806,6 +14440,14 @@
               <a:rPr lang="en-CH" dirty="0"/>
               <a:t>Wear &amp; Aging</a:t>
             </a:r>
+            <a:br>
+              <a:rPr lang="en-CH" dirty="0"/>
+            </a:br>
+            <a:r>
+              <a:rPr lang="en-CH" sz="1800" b="0" dirty="0"/>
+              <a:t>Systematic Characteristics</a:t>
+            </a:r>
+            <a:endParaRPr lang="en-CH" sz="1800" dirty="0"/>
           </a:p>
         </p:txBody>
       </p:sp>
@@ -12068,7 +14710,7 @@
         <p:spPr/>
         <p:txBody>
           <a:bodyPr>
-            <a:normAutofit/>
+            <a:normAutofit fontScale="90000"/>
           </a:bodyPr>
           <a:lstStyle/>
           <a:p>
@@ -12076,6 +14718,14 @@
               <a:rPr lang="en-CH" dirty="0"/>
               <a:t>Error Bands</a:t>
             </a:r>
+            <a:br>
+              <a:rPr lang="en-CH" dirty="0"/>
+            </a:br>
+            <a:r>
+              <a:rPr lang="en-CH" sz="1800" b="0" dirty="0"/>
+              <a:t>Systematic Characteristics</a:t>
+            </a:r>
+            <a:endParaRPr lang="en-CH" sz="1800" dirty="0"/>
           </a:p>
         </p:txBody>
       </p:sp>
@@ -17199,7 +19849,7 @@
                   <a:buNone/>
                 </a:pPr>
                 <a:r>
-                  <a:rPr lang="en-CH" sz="1800" b="1" dirty="0">
+                  <a:rPr lang="en-CH" sz="2000" b="1" dirty="0">
                     <a:solidFill>
                       <a:schemeClr val="accent1"/>
                     </a:solidFill>
@@ -17696,409 +20346,47 @@
           <a:lstStyle/>
           <a:p>
             <a:r>
-              <a:rPr lang="en-GB" sz="4000" dirty="0"/>
-              <a:t>O</a:t>
-            </a:r>
-            <a:r>
-              <a:rPr lang="en-CH" sz="4000" dirty="0" err="1"/>
-              <a:t>verview</a:t>
-            </a:r>
-            <a:endParaRPr lang="en-CH" sz="4000" dirty="0"/>
+              <a:rPr lang="en-CH" sz="4000" dirty="0"/>
+              <a:t>Overview</a:t>
+            </a:r>
           </a:p>
         </p:txBody>
       </p:sp>
-      <mc:AlternateContent xmlns:mc="http://schemas.openxmlformats.org/markup-compatibility/2006" xmlns:pslz="http://schemas.microsoft.com/office/powerpoint/2016/slidezoom">
-        <mc:Choice Requires="pslz">
-          <p:graphicFrame>
-            <p:nvGraphicFramePr>
-              <p:cNvPr id="6" name="Slide Zoom 5">
-                <a:extLst>
-                  <a:ext uri="{FF2B5EF4-FFF2-40B4-BE49-F238E27FC236}">
-                    <a16:creationId xmlns:a16="http://schemas.microsoft.com/office/drawing/2014/main" id="{A9589870-F89B-52BE-5192-E0696922F333}"/>
-                  </a:ext>
-                </a:extLst>
-              </p:cNvPr>
-              <p:cNvGraphicFramePr>
-                <a:graphicFrameLocks noChangeAspect="1"/>
-              </p:cNvGraphicFramePr>
-              <p:nvPr>
-                <p:extLst>
-                  <p:ext uri="{D42A27DB-BD31-4B8C-83A1-F6EECF244321}">
-                    <p14:modId xmlns:p14="http://schemas.microsoft.com/office/powerpoint/2010/main" val="1090902536"/>
-                  </p:ext>
-                </p:extLst>
-              </p:nvPr>
-            </p:nvGraphicFramePr>
-            <p:xfrm>
-              <a:off x="696031" y="1160595"/>
-              <a:ext cx="3429327" cy="2160000"/>
-            </p:xfrm>
-            <a:graphic>
-              <a:graphicData uri="http://schemas.microsoft.com/office/powerpoint/2016/slidezoom">
-                <pslz:sldZm>
-                  <pslz:sldZmObj sldId="258" cId="3192687471">
-                    <pslz:zmPr id="{3F3B3383-6595-474B-95CF-80B2276E155C}" returnToParent="0" transitionDur="1000">
-                      <p166:blipFill xmlns:p166="http://schemas.microsoft.com/office/powerpoint/2016/6/main">
-                        <a:blip r:embed="rId2"/>
-                        <a:stretch>
-                          <a:fillRect/>
-                        </a:stretch>
-                      </p166:blipFill>
-                      <p166:spPr xmlns:p166="http://schemas.microsoft.com/office/powerpoint/2016/6/main">
-                        <a:xfrm>
-                          <a:off x="0" y="0"/>
-                          <a:ext cx="3429327" cy="2160000"/>
-                        </a:xfrm>
-                        <a:prstGeom prst="rect">
-                          <a:avLst/>
-                        </a:prstGeom>
-                        <a:ln w="3175">
-                          <a:solidFill>
-                            <a:prstClr val="ltGray"/>
-                          </a:solidFill>
-                        </a:ln>
-                      </p166:spPr>
-                    </pslz:zmPr>
-                  </pslz:sldZmObj>
-                </pslz:sldZm>
-              </a:graphicData>
-            </a:graphic>
-          </p:graphicFrame>
-        </mc:Choice>
-        <mc:Fallback xmlns="">
-          <p:pic>
-            <p:nvPicPr>
-              <p:cNvPr id="6" name="Slide Zoom 5">
-                <a:hlinkClick r:id="rId3" action="ppaction://hlinksldjump"/>
-                <a:extLst>
-                  <a:ext uri="{FF2B5EF4-FFF2-40B4-BE49-F238E27FC236}">
-                    <a16:creationId xmlns:a16="http://schemas.microsoft.com/office/drawing/2014/main" id="{A9589870-F89B-52BE-5192-E0696922F333}"/>
-                  </a:ext>
-                </a:extLst>
-              </p:cNvPr>
-              <p:cNvPicPr>
-                <a:picLocks noGrp="1" noRot="1" noChangeAspect="1" noMove="1" noResize="1" noEditPoints="1" noAdjustHandles="1" noChangeArrowheads="1" noChangeShapeType="1"/>
-              </p:cNvPicPr>
-              <p:nvPr/>
-            </p:nvPicPr>
-            <p:blipFill>
-              <a:blip r:embed="rId4"/>
-              <a:stretch>
-                <a:fillRect/>
-              </a:stretch>
-            </p:blipFill>
-            <p:spPr>
-              <a:xfrm>
-                <a:off x="696031" y="1160595"/>
-                <a:ext cx="3429327" cy="2160000"/>
-              </a:xfrm>
-              <a:prstGeom prst="rect">
-                <a:avLst/>
-              </a:prstGeom>
-              <a:ln w="3175">
-                <a:solidFill>
-                  <a:prstClr val="ltGray"/>
-                </a:solidFill>
-              </a:ln>
-            </p:spPr>
-          </p:pic>
-        </mc:Fallback>
-      </mc:AlternateContent>
-      <mc:AlternateContent xmlns:mc="http://schemas.openxmlformats.org/markup-compatibility/2006" xmlns:pslz="http://schemas.microsoft.com/office/powerpoint/2016/slidezoom">
-        <mc:Choice Requires="pslz">
-          <p:graphicFrame>
-            <p:nvGraphicFramePr>
-              <p:cNvPr id="9" name="Slide Zoom 8">
-                <a:extLst>
-                  <a:ext uri="{FF2B5EF4-FFF2-40B4-BE49-F238E27FC236}">
-                    <a16:creationId xmlns:a16="http://schemas.microsoft.com/office/drawing/2014/main" id="{3C442ED3-2998-D985-F0C9-9C325CF8751D}"/>
-                  </a:ext>
-                </a:extLst>
-              </p:cNvPr>
-              <p:cNvGraphicFramePr>
-                <a:graphicFrameLocks noChangeAspect="1"/>
-              </p:cNvGraphicFramePr>
-              <p:nvPr>
-                <p:extLst>
-                  <p:ext uri="{D42A27DB-BD31-4B8C-83A1-F6EECF244321}">
-                    <p14:modId xmlns:p14="http://schemas.microsoft.com/office/powerpoint/2010/main" val="2266978374"/>
-                  </p:ext>
-                </p:extLst>
-              </p:nvPr>
-            </p:nvGraphicFramePr>
-            <p:xfrm>
-              <a:off x="5018641" y="1160595"/>
-              <a:ext cx="3429327" cy="2160000"/>
-            </p:xfrm>
-            <a:graphic>
-              <a:graphicData uri="http://schemas.microsoft.com/office/powerpoint/2016/slidezoom">
-                <pslz:sldZm>
-                  <pslz:sldZmObj sldId="269" cId="2882679562">
-                    <pslz:zmPr id="{0594A516-BE1C-4B27-9E4B-D64148A657B7}" returnToParent="0" transitionDur="1000">
-                      <p166:blipFill xmlns:p166="http://schemas.microsoft.com/office/powerpoint/2016/6/main">
-                        <a:blip r:embed="rId5"/>
-                        <a:stretch>
-                          <a:fillRect/>
-                        </a:stretch>
-                      </p166:blipFill>
-                      <p166:spPr xmlns:p166="http://schemas.microsoft.com/office/powerpoint/2016/6/main">
-                        <a:xfrm>
-                          <a:off x="0" y="0"/>
-                          <a:ext cx="3429327" cy="2160000"/>
-                        </a:xfrm>
-                        <a:prstGeom prst="rect">
-                          <a:avLst/>
-                        </a:prstGeom>
-                        <a:ln w="3175">
-                          <a:solidFill>
-                            <a:prstClr val="ltGray"/>
-                          </a:solidFill>
-                        </a:ln>
-                      </p166:spPr>
-                    </pslz:zmPr>
-                  </pslz:sldZmObj>
-                </pslz:sldZm>
-              </a:graphicData>
-            </a:graphic>
-          </p:graphicFrame>
-        </mc:Choice>
-        <mc:Fallback xmlns="">
-          <p:pic>
-            <p:nvPicPr>
-              <p:cNvPr id="9" name="Slide Zoom 8">
-                <a:hlinkClick r:id="rId6" action="ppaction://hlinksldjump"/>
-                <a:extLst>
-                  <a:ext uri="{FF2B5EF4-FFF2-40B4-BE49-F238E27FC236}">
-                    <a16:creationId xmlns:a16="http://schemas.microsoft.com/office/drawing/2014/main" id="{3C442ED3-2998-D985-F0C9-9C325CF8751D}"/>
-                  </a:ext>
-                </a:extLst>
-              </p:cNvPr>
-              <p:cNvPicPr>
-                <a:picLocks noGrp="1" noRot="1" noChangeAspect="1" noMove="1" noResize="1" noEditPoints="1" noAdjustHandles="1" noChangeArrowheads="1" noChangeShapeType="1"/>
-              </p:cNvPicPr>
-              <p:nvPr/>
-            </p:nvPicPr>
-            <p:blipFill>
-              <a:blip r:embed="rId7"/>
-              <a:stretch>
-                <a:fillRect/>
-              </a:stretch>
-            </p:blipFill>
-            <p:spPr>
-              <a:xfrm>
-                <a:off x="5018641" y="1160595"/>
-                <a:ext cx="3429327" cy="2160000"/>
-              </a:xfrm>
-              <a:prstGeom prst="rect">
-                <a:avLst/>
-              </a:prstGeom>
-              <a:ln w="3175">
-                <a:solidFill>
-                  <a:prstClr val="ltGray"/>
-                </a:solidFill>
-              </a:ln>
-            </p:spPr>
-          </p:pic>
-        </mc:Fallback>
-      </mc:AlternateContent>
-      <mc:AlternateContent xmlns:mc="http://schemas.openxmlformats.org/markup-compatibility/2006" xmlns:pslz="http://schemas.microsoft.com/office/powerpoint/2016/slidezoom">
-        <mc:Choice Requires="pslz">
-          <p:graphicFrame>
-            <p:nvGraphicFramePr>
-              <p:cNvPr id="11" name="Slide Zoom 10">
-                <a:extLst>
-                  <a:ext uri="{FF2B5EF4-FFF2-40B4-BE49-F238E27FC236}">
-                    <a16:creationId xmlns:a16="http://schemas.microsoft.com/office/drawing/2014/main" id="{CD71EECB-E4C2-F949-C772-FD42375E4531}"/>
-                  </a:ext>
-                </a:extLst>
-              </p:cNvPr>
-              <p:cNvGraphicFramePr>
-                <a:graphicFrameLocks noChangeAspect="1"/>
-              </p:cNvGraphicFramePr>
-              <p:nvPr>
-                <p:extLst>
-                  <p:ext uri="{D42A27DB-BD31-4B8C-83A1-F6EECF244321}">
-                    <p14:modId xmlns:p14="http://schemas.microsoft.com/office/powerpoint/2010/main" val="3342224058"/>
-                  </p:ext>
-                </p:extLst>
-              </p:nvPr>
-            </p:nvGraphicFramePr>
-            <p:xfrm>
-              <a:off x="5018640" y="3419450"/>
-              <a:ext cx="3429327" cy="2160000"/>
-            </p:xfrm>
-            <a:graphic>
-              <a:graphicData uri="http://schemas.microsoft.com/office/powerpoint/2016/slidezoom">
-                <pslz:sldZm>
-                  <pslz:sldZmObj sldId="271" cId="2079010368">
-                    <pslz:zmPr id="{28517182-8E9A-4D60-9B36-F60AC016240C}" returnToParent="0" transitionDur="1000">
-                      <p166:blipFill xmlns:p166="http://schemas.microsoft.com/office/powerpoint/2016/6/main">
-                        <a:blip r:embed="rId8"/>
-                        <a:stretch>
-                          <a:fillRect/>
-                        </a:stretch>
-                      </p166:blipFill>
-                      <p166:spPr xmlns:p166="http://schemas.microsoft.com/office/powerpoint/2016/6/main">
-                        <a:xfrm>
-                          <a:off x="0" y="0"/>
-                          <a:ext cx="3429327" cy="2160000"/>
-                        </a:xfrm>
-                        <a:prstGeom prst="rect">
-                          <a:avLst/>
-                        </a:prstGeom>
-                        <a:ln w="3175">
-                          <a:solidFill>
-                            <a:prstClr val="ltGray"/>
-                          </a:solidFill>
-                        </a:ln>
-                      </p166:spPr>
-                    </pslz:zmPr>
-                  </pslz:sldZmObj>
-                </pslz:sldZm>
-              </a:graphicData>
-            </a:graphic>
-          </p:graphicFrame>
-        </mc:Choice>
-        <mc:Fallback xmlns="">
-          <p:pic>
-            <p:nvPicPr>
-              <p:cNvPr id="11" name="Slide Zoom 10">
-                <a:hlinkClick r:id="rId9" action="ppaction://hlinksldjump"/>
-                <a:extLst>
-                  <a:ext uri="{FF2B5EF4-FFF2-40B4-BE49-F238E27FC236}">
-                    <a16:creationId xmlns:a16="http://schemas.microsoft.com/office/drawing/2014/main" id="{CD71EECB-E4C2-F949-C772-FD42375E4531}"/>
-                  </a:ext>
-                </a:extLst>
-              </p:cNvPr>
-              <p:cNvPicPr>
-                <a:picLocks noGrp="1" noRot="1" noChangeAspect="1" noMove="1" noResize="1" noEditPoints="1" noAdjustHandles="1" noChangeArrowheads="1" noChangeShapeType="1"/>
-              </p:cNvPicPr>
-              <p:nvPr/>
-            </p:nvPicPr>
-            <p:blipFill>
-              <a:blip r:embed="rId10"/>
-              <a:stretch>
-                <a:fillRect/>
-              </a:stretch>
-            </p:blipFill>
-            <p:spPr>
-              <a:xfrm>
-                <a:off x="5018640" y="3419450"/>
-                <a:ext cx="3429327" cy="2160000"/>
-              </a:xfrm>
-              <a:prstGeom prst="rect">
-                <a:avLst/>
-              </a:prstGeom>
-              <a:ln w="3175">
-                <a:solidFill>
-                  <a:prstClr val="ltGray"/>
-                </a:solidFill>
-              </a:ln>
-            </p:spPr>
-          </p:pic>
-        </mc:Fallback>
-      </mc:AlternateContent>
-      <mc:AlternateContent xmlns:mc="http://schemas.openxmlformats.org/markup-compatibility/2006" xmlns:pslz="http://schemas.microsoft.com/office/powerpoint/2016/slidezoom">
-        <mc:Choice Requires="pslz">
-          <p:graphicFrame>
-            <p:nvGraphicFramePr>
-              <p:cNvPr id="13" name="Slide Zoom 12">
-                <a:extLst>
-                  <a:ext uri="{FF2B5EF4-FFF2-40B4-BE49-F238E27FC236}">
-                    <a16:creationId xmlns:a16="http://schemas.microsoft.com/office/drawing/2014/main" id="{D4B6477E-792C-DEA8-1A4C-253E58F6647A}"/>
-                  </a:ext>
-                </a:extLst>
-              </p:cNvPr>
-              <p:cNvGraphicFramePr>
-                <a:graphicFrameLocks noChangeAspect="1"/>
-              </p:cNvGraphicFramePr>
-              <p:nvPr>
-                <p:extLst>
-                  <p:ext uri="{D42A27DB-BD31-4B8C-83A1-F6EECF244321}">
-                    <p14:modId xmlns:p14="http://schemas.microsoft.com/office/powerpoint/2010/main" val="1132688286"/>
-                  </p:ext>
-                </p:extLst>
-              </p:nvPr>
-            </p:nvGraphicFramePr>
-            <p:xfrm>
-              <a:off x="696031" y="3419450"/>
-              <a:ext cx="3429327" cy="2160000"/>
-            </p:xfrm>
-            <a:graphic>
-              <a:graphicData uri="http://schemas.microsoft.com/office/powerpoint/2016/slidezoom">
-                <pslz:sldZm>
-                  <pslz:sldZmObj sldId="274" cId="2177801348">
-                    <pslz:zmPr id="{FA6FB03A-C9FD-45F5-98D9-A92EB413764E}" returnToParent="0" transitionDur="1000">
-                      <p166:blipFill xmlns:p166="http://schemas.microsoft.com/office/powerpoint/2016/6/main">
-                        <a:blip r:embed="rId11"/>
-                        <a:stretch>
-                          <a:fillRect/>
-                        </a:stretch>
-                      </p166:blipFill>
-                      <p166:spPr xmlns:p166="http://schemas.microsoft.com/office/powerpoint/2016/6/main">
-                        <a:xfrm>
-                          <a:off x="0" y="0"/>
-                          <a:ext cx="3429327" cy="2160000"/>
-                        </a:xfrm>
-                        <a:prstGeom prst="rect">
-                          <a:avLst/>
-                        </a:prstGeom>
-                        <a:ln w="3175">
-                          <a:solidFill>
-                            <a:prstClr val="ltGray"/>
-                          </a:solidFill>
-                        </a:ln>
-                      </p166:spPr>
-                    </pslz:zmPr>
-                  </pslz:sldZmObj>
-                </pslz:sldZm>
-              </a:graphicData>
-            </a:graphic>
-          </p:graphicFrame>
-        </mc:Choice>
-        <mc:Fallback xmlns="">
-          <p:pic>
-            <p:nvPicPr>
-              <p:cNvPr id="13" name="Slide Zoom 12">
-                <a:hlinkClick r:id="rId12" action="ppaction://hlinksldjump"/>
-                <a:extLst>
-                  <a:ext uri="{FF2B5EF4-FFF2-40B4-BE49-F238E27FC236}">
-                    <a16:creationId xmlns:a16="http://schemas.microsoft.com/office/drawing/2014/main" id="{D4B6477E-792C-DEA8-1A4C-253E58F6647A}"/>
-                  </a:ext>
-                </a:extLst>
-              </p:cNvPr>
-              <p:cNvPicPr>
-                <a:picLocks noGrp="1" noRot="1" noChangeAspect="1" noMove="1" noResize="1" noEditPoints="1" noAdjustHandles="1" noChangeArrowheads="1" noChangeShapeType="1"/>
-              </p:cNvPicPr>
-              <p:nvPr/>
-            </p:nvPicPr>
-            <p:blipFill>
-              <a:blip r:embed="rId13"/>
-              <a:stretch>
-                <a:fillRect/>
-              </a:stretch>
-            </p:blipFill>
-            <p:spPr>
-              <a:xfrm>
-                <a:off x="696031" y="3419450"/>
-                <a:ext cx="3429327" cy="2160000"/>
-              </a:xfrm>
-              <a:prstGeom prst="rect">
-                <a:avLst/>
-              </a:prstGeom>
-              <a:ln w="3175">
-                <a:solidFill>
-                  <a:prstClr val="ltGray"/>
-                </a:solidFill>
-              </a:ln>
-            </p:spPr>
-          </p:pic>
-        </mc:Fallback>
-      </mc:AlternateContent>
+      <p:graphicFrame>
+        <p:nvGraphicFramePr>
+          <p:cNvPr id="8" name="Content Placeholder 7">
+            <a:extLst>
+              <a:ext uri="{FF2B5EF4-FFF2-40B4-BE49-F238E27FC236}">
+                <a16:creationId xmlns:a16="http://schemas.microsoft.com/office/drawing/2014/main" id="{38769C3B-DB07-C067-4C10-8E7FE469BE7F}"/>
+              </a:ext>
+            </a:extLst>
+          </p:cNvPr>
+          <p:cNvGraphicFramePr>
+            <a:graphicFrameLocks noGrp="1"/>
+          </p:cNvGraphicFramePr>
+          <p:nvPr>
+            <p:ph sz="quarter" idx="13"/>
+            <p:extLst>
+              <p:ext uri="{D42A27DB-BD31-4B8C-83A1-F6EECF244321}">
+                <p14:modId xmlns:p14="http://schemas.microsoft.com/office/powerpoint/2010/main" val="3787186700"/>
+              </p:ext>
+            </p:extLst>
+          </p:nvPr>
+        </p:nvGraphicFramePr>
+        <p:xfrm>
+          <a:off x="360363" y="1079500"/>
+          <a:ext cx="8423275" cy="3870325"/>
+        </p:xfrm>
+        <a:graphic>
+          <a:graphicData uri="http://schemas.openxmlformats.org/drawingml/2006/diagram">
+            <dgm:relIds xmlns:dgm="http://schemas.openxmlformats.org/drawingml/2006/diagram" xmlns:r="http://schemas.openxmlformats.org/officeDocument/2006/relationships" r:dm="rId2" r:lo="rId3" r:qs="rId4" r:cs="rId5"/>
+          </a:graphicData>
+        </a:graphic>
+      </p:graphicFrame>
     </p:spTree>
     <p:extLst>
       <p:ext uri="{BB962C8B-B14F-4D97-AF65-F5344CB8AC3E}">
-        <p14:creationId xmlns:p14="http://schemas.microsoft.com/office/powerpoint/2010/main" val="2355246635"/>
+        <p14:creationId xmlns:p14="http://schemas.microsoft.com/office/powerpoint/2010/main" val="3161146745"/>
       </p:ext>
     </p:extLst>
   </p:cSld>
@@ -18143,13 +20431,23 @@
         </p:nvSpPr>
         <p:spPr/>
         <p:txBody>
-          <a:bodyPr/>
+          <a:bodyPr>
+            <a:normAutofit fontScale="90000"/>
+          </a:bodyPr>
           <a:lstStyle/>
           <a:p>
             <a:r>
               <a:rPr lang="en-CH" dirty="0"/>
               <a:t>Range &amp; Span</a:t>
             </a:r>
+            <a:br>
+              <a:rPr lang="en-CH" dirty="0"/>
+            </a:br>
+            <a:r>
+              <a:rPr lang="en-CH" sz="1800" b="0" dirty="0"/>
+              <a:t>Systematic Characteristics</a:t>
+            </a:r>
+            <a:endParaRPr lang="en-CH" b="0" dirty="0"/>
           </a:p>
         </p:txBody>
       </p:sp>
@@ -18248,13 +20546,23 @@
         </p:nvSpPr>
         <p:spPr/>
         <p:txBody>
-          <a:bodyPr/>
+          <a:bodyPr>
+            <a:normAutofit fontScale="90000"/>
+          </a:bodyPr>
           <a:lstStyle/>
           <a:p>
             <a:r>
               <a:rPr lang="en-CH" dirty="0"/>
               <a:t>Ideal Straight Line &amp; Non-Linearity</a:t>
             </a:r>
+            <a:br>
+              <a:rPr lang="en-CH" sz="3600" b="0" dirty="0"/>
+            </a:br>
+            <a:r>
+              <a:rPr lang="en-CH" sz="1800" b="0" dirty="0"/>
+              <a:t>Systematic Characteristics</a:t>
+            </a:r>
+            <a:endParaRPr lang="en-CH" dirty="0"/>
           </a:p>
         </p:txBody>
       </p:sp>
@@ -18810,7 +21118,7 @@
         <p:spPr/>
         <p:txBody>
           <a:bodyPr>
-            <a:normAutofit/>
+            <a:normAutofit fontScale="90000"/>
           </a:bodyPr>
           <a:lstStyle/>
           <a:p>
@@ -18818,6 +21126,14 @@
               <a:rPr lang="en-CH" dirty="0"/>
               <a:t>Sensitivity</a:t>
             </a:r>
+            <a:br>
+              <a:rPr lang="en-CH" sz="3600" b="0" dirty="0"/>
+            </a:br>
+            <a:r>
+              <a:rPr lang="en-CH" sz="1800" b="0" dirty="0"/>
+              <a:t>Systematic Characteristics</a:t>
+            </a:r>
+            <a:endParaRPr lang="en-CH" sz="1800" dirty="0"/>
           </a:p>
         </p:txBody>
       </p:sp>
@@ -19522,13 +21838,23 @@
         </p:nvSpPr>
         <p:spPr/>
         <p:txBody>
-          <a:bodyPr/>
+          <a:bodyPr>
+            <a:normAutofit fontScale="90000"/>
+          </a:bodyPr>
           <a:lstStyle/>
           <a:p>
             <a:r>
               <a:rPr lang="en-CH" dirty="0"/>
               <a:t>Environmental Effects</a:t>
             </a:r>
+            <a:br>
+              <a:rPr lang="en-CH" dirty="0"/>
+            </a:br>
+            <a:r>
+              <a:rPr lang="en-CH" sz="1800" b="0" dirty="0"/>
+              <a:t>Systematic Characteristics</a:t>
+            </a:r>
+            <a:endParaRPr lang="en-CH" sz="1800" dirty="0"/>
           </a:p>
         </p:txBody>
       </p:sp>
@@ -20293,7 +22619,7 @@
         <p:spPr/>
         <p:txBody>
           <a:bodyPr>
-            <a:normAutofit/>
+            <a:normAutofit fontScale="90000"/>
           </a:bodyPr>
           <a:lstStyle/>
           <a:p>
@@ -20301,6 +22627,14 @@
               <a:rPr lang="en-CH" dirty="0"/>
               <a:t>Hysteresis</a:t>
             </a:r>
+            <a:br>
+              <a:rPr lang="en-CH" dirty="0"/>
+            </a:br>
+            <a:r>
+              <a:rPr lang="en-CH" sz="1800" b="0" dirty="0"/>
+              <a:t>Systematic Characteristics</a:t>
+            </a:r>
+            <a:endParaRPr lang="en-CH" sz="1800" dirty="0"/>
           </a:p>
         </p:txBody>
       </p:sp>
@@ -20654,7 +22988,7 @@
         <p:spPr/>
         <p:txBody>
           <a:bodyPr>
-            <a:normAutofit/>
+            <a:normAutofit fontScale="90000"/>
           </a:bodyPr>
           <a:lstStyle/>
           <a:p>
@@ -20662,6 +22996,14 @@
               <a:rPr lang="en-CH" dirty="0"/>
               <a:t>Resolution</a:t>
             </a:r>
+            <a:br>
+              <a:rPr lang="en-CH" dirty="0"/>
+            </a:br>
+            <a:r>
+              <a:rPr lang="en-CH" sz="1800" b="0" dirty="0"/>
+              <a:t>Systematic Characteristics</a:t>
+            </a:r>
+            <a:endParaRPr lang="en-CH" sz="1800" dirty="0"/>
           </a:p>
         </p:txBody>
       </p:sp>

</xml_diff>